<commit_message>
added a verilog file folder
I deleted all the stray .v files (I saved them elsewhere in case there
was something not copied) and I made a folder with all the up to date
verilog files for the project.
</commit_message>
<xml_diff>
--- a/Controler State Diagram.pptx
+++ b/Controler State Diagram.pptx
@@ -243,7 +243,7 @@
           <a:p>
             <a:fld id="{7263965C-B786-41CD-9E6F-8409F6FBC268}" type="datetimeFigureOut">
               <a:rPr lang="en-US" smtClean="0"/>
-              <a:t>1/27/2015</a:t>
+              <a:t>2/5/2015</a:t>
             </a:fld>
             <a:endParaRPr lang="en-US"/>
           </a:p>
@@ -413,7 +413,7 @@
           <a:p>
             <a:fld id="{7263965C-B786-41CD-9E6F-8409F6FBC268}" type="datetimeFigureOut">
               <a:rPr lang="en-US" smtClean="0"/>
-              <a:t>1/27/2015</a:t>
+              <a:t>2/5/2015</a:t>
             </a:fld>
             <a:endParaRPr lang="en-US"/>
           </a:p>
@@ -593,7 +593,7 @@
           <a:p>
             <a:fld id="{7263965C-B786-41CD-9E6F-8409F6FBC268}" type="datetimeFigureOut">
               <a:rPr lang="en-US" smtClean="0"/>
-              <a:t>1/27/2015</a:t>
+              <a:t>2/5/2015</a:t>
             </a:fld>
             <a:endParaRPr lang="en-US"/>
           </a:p>
@@ -763,7 +763,7 @@
           <a:p>
             <a:fld id="{7263965C-B786-41CD-9E6F-8409F6FBC268}" type="datetimeFigureOut">
               <a:rPr lang="en-US" smtClean="0"/>
-              <a:t>1/27/2015</a:t>
+              <a:t>2/5/2015</a:t>
             </a:fld>
             <a:endParaRPr lang="en-US"/>
           </a:p>
@@ -1009,7 +1009,7 @@
           <a:p>
             <a:fld id="{7263965C-B786-41CD-9E6F-8409F6FBC268}" type="datetimeFigureOut">
               <a:rPr lang="en-US" smtClean="0"/>
-              <a:t>1/27/2015</a:t>
+              <a:t>2/5/2015</a:t>
             </a:fld>
             <a:endParaRPr lang="en-US"/>
           </a:p>
@@ -1241,7 +1241,7 @@
           <a:p>
             <a:fld id="{7263965C-B786-41CD-9E6F-8409F6FBC268}" type="datetimeFigureOut">
               <a:rPr lang="en-US" smtClean="0"/>
-              <a:t>1/27/2015</a:t>
+              <a:t>2/5/2015</a:t>
             </a:fld>
             <a:endParaRPr lang="en-US"/>
           </a:p>
@@ -1608,7 +1608,7 @@
           <a:p>
             <a:fld id="{7263965C-B786-41CD-9E6F-8409F6FBC268}" type="datetimeFigureOut">
               <a:rPr lang="en-US" smtClean="0"/>
-              <a:t>1/27/2015</a:t>
+              <a:t>2/5/2015</a:t>
             </a:fld>
             <a:endParaRPr lang="en-US"/>
           </a:p>
@@ -1726,7 +1726,7 @@
           <a:p>
             <a:fld id="{7263965C-B786-41CD-9E6F-8409F6FBC268}" type="datetimeFigureOut">
               <a:rPr lang="en-US" smtClean="0"/>
-              <a:t>1/27/2015</a:t>
+              <a:t>2/5/2015</a:t>
             </a:fld>
             <a:endParaRPr lang="en-US"/>
           </a:p>
@@ -1821,7 +1821,7 @@
           <a:p>
             <a:fld id="{7263965C-B786-41CD-9E6F-8409F6FBC268}" type="datetimeFigureOut">
               <a:rPr lang="en-US" smtClean="0"/>
-              <a:t>1/27/2015</a:t>
+              <a:t>2/5/2015</a:t>
             </a:fld>
             <a:endParaRPr lang="en-US"/>
           </a:p>
@@ -2098,7 +2098,7 @@
           <a:p>
             <a:fld id="{7263965C-B786-41CD-9E6F-8409F6FBC268}" type="datetimeFigureOut">
               <a:rPr lang="en-US" smtClean="0"/>
-              <a:t>1/27/2015</a:t>
+              <a:t>2/5/2015</a:t>
             </a:fld>
             <a:endParaRPr lang="en-US"/>
           </a:p>
@@ -2351,7 +2351,7 @@
           <a:p>
             <a:fld id="{7263965C-B786-41CD-9E6F-8409F6FBC268}" type="datetimeFigureOut">
               <a:rPr lang="en-US" smtClean="0"/>
-              <a:t>1/27/2015</a:t>
+              <a:t>2/5/2015</a:t>
             </a:fld>
             <a:endParaRPr lang="en-US"/>
           </a:p>
@@ -2564,7 +2564,7 @@
           <a:p>
             <a:fld id="{7263965C-B786-41CD-9E6F-8409F6FBC268}" type="datetimeFigureOut">
               <a:rPr lang="en-US" smtClean="0"/>
-              <a:t>1/27/2015</a:t>
+              <a:t>2/5/2015</a:t>
             </a:fld>
             <a:endParaRPr lang="en-US"/>
           </a:p>
@@ -3101,7 +3101,7 @@
           <a:p>
             <a:pPr algn="ctr"/>
             <a:r>
-              <a:rPr lang="en-US" sz="1200" dirty="0" smtClean="0">
+              <a:rPr lang="en-US" sz="1200" b="1" dirty="0" smtClean="0">
                 <a:solidFill>
                   <a:schemeClr val="tx1"/>
                 </a:solidFill>
@@ -3136,18 +3136,13 @@
           <a:p>
             <a:pPr algn="ctr"/>
             <a:r>
-              <a:rPr lang="en-US" sz="1000" dirty="0" err="1" smtClean="0">
+              <a:rPr lang="en-US" sz="1000" dirty="0" smtClean="0">
                 <a:solidFill>
                   <a:schemeClr val="bg1"/>
                 </a:solidFill>
               </a:rPr>
               <a:t>Bwrt</a:t>
             </a:r>
-            <a:endParaRPr lang="en-US" sz="1000" dirty="0" smtClean="0">
-              <a:solidFill>
-                <a:schemeClr val="bg1"/>
-              </a:solidFill>
-            </a:endParaRPr>
           </a:p>
           <a:p>
             <a:pPr algn="ctr"/>
@@ -3160,14 +3155,6 @@
               <a:t>useReg</a:t>
             </a:r>
             <a:endParaRPr lang="en-US" sz="1000" dirty="0" smtClean="0">
-              <a:solidFill>
-                <a:schemeClr val="bg1"/>
-              </a:solidFill>
-            </a:endParaRPr>
-          </a:p>
-          <a:p>
-            <a:pPr algn="ctr"/>
-            <a:endParaRPr lang="en-US" sz="1200" dirty="0">
               <a:solidFill>
                 <a:schemeClr val="bg1"/>
               </a:solidFill>
@@ -3220,13 +3207,29 @@
           <a:p>
             <a:pPr algn="ctr"/>
             <a:r>
-              <a:rPr lang="en-US" sz="1200" dirty="0" smtClean="0">
+              <a:rPr lang="en-US" sz="1200" b="1" dirty="0" smtClean="0">
                 <a:solidFill>
                   <a:schemeClr val="tx1"/>
                 </a:solidFill>
               </a:rPr>
-              <a:t>E R-type</a:t>
-            </a:r>
+              <a:t>E</a:t>
+            </a:r>
+          </a:p>
+          <a:p>
+            <a:pPr algn="ctr"/>
+            <a:r>
+              <a:rPr lang="en-US" sz="1200" b="1" dirty="0" smtClean="0">
+                <a:solidFill>
+                  <a:schemeClr val="tx1"/>
+                </a:solidFill>
+              </a:rPr>
+              <a:t>R-type</a:t>
+            </a:r>
+            <a:endParaRPr lang="en-US" sz="1200" b="1" dirty="0" smtClean="0">
+              <a:solidFill>
+                <a:schemeClr val="tx1"/>
+              </a:solidFill>
+            </a:endParaRPr>
           </a:p>
           <a:p>
             <a:pPr algn="ctr"/>
@@ -3254,7 +3257,7 @@
         </p:nvSpPr>
         <p:spPr>
           <a:xfrm>
-            <a:off x="8984575" y="108932"/>
+            <a:off x="8983721" y="-31770"/>
             <a:ext cx="1078302" cy="1078302"/>
           </a:xfrm>
           <a:prstGeom prst="ellipse">
@@ -3291,14 +3294,14 @@
           <a:p>
             <a:pPr algn="ctr"/>
             <a:r>
-              <a:rPr lang="en-US" sz="1050" dirty="0" smtClean="0">
+              <a:rPr lang="en-US" sz="1050" b="1" dirty="0" smtClean="0">
                 <a:solidFill>
                   <a:schemeClr val="tx1"/>
                 </a:solidFill>
               </a:rPr>
               <a:t>MR R-type</a:t>
             </a:r>
-            <a:endParaRPr lang="en-US" sz="1050" dirty="0">
+            <a:endParaRPr lang="en-US" sz="1050" b="1" dirty="0">
               <a:solidFill>
                 <a:schemeClr val="tx1"/>
               </a:solidFill>
@@ -3339,297 +3342,12 @@
               <a:t> = </a:t>
             </a:r>
             <a:r>
-              <a:rPr lang="en-US" sz="1000" dirty="0" err="1" smtClean="0">
+              <a:rPr lang="en-US" sz="1000" dirty="0" smtClean="0">
                 <a:solidFill>
                   <a:schemeClr val="bg1"/>
                 </a:solidFill>
               </a:rPr>
-              <a:t>ALUout</a:t>
-            </a:r>
-            <a:endParaRPr lang="en-US" sz="1000" dirty="0">
-              <a:solidFill>
-                <a:schemeClr val="bg1"/>
-              </a:solidFill>
-            </a:endParaRPr>
-          </a:p>
-        </p:txBody>
-      </p:sp>
-      <p:sp>
-        <p:nvSpPr>
-          <p:cNvPr id="8" name="Oval 7"/>
-          <p:cNvSpPr/>
-          <p:nvPr/>
-        </p:nvSpPr>
-        <p:spPr>
-          <a:xfrm>
-            <a:off x="7509293" y="3325482"/>
-            <a:ext cx="992037" cy="992037"/>
-          </a:xfrm>
-          <a:prstGeom prst="ellipse">
-            <a:avLst/>
-          </a:prstGeom>
-          <a:solidFill>
-            <a:srgbClr val="0070C0"/>
-          </a:solidFill>
-          <a:ln>
-            <a:solidFill>
-              <a:schemeClr val="tx1"/>
-            </a:solidFill>
-          </a:ln>
-        </p:spPr>
-        <p:style>
-          <a:lnRef idx="2">
-            <a:schemeClr val="accent1">
-              <a:shade val="50000"/>
-            </a:schemeClr>
-          </a:lnRef>
-          <a:fillRef idx="1">
-            <a:schemeClr val="accent1"/>
-          </a:fillRef>
-          <a:effectRef idx="0">
-            <a:schemeClr val="accent1"/>
-          </a:effectRef>
-          <a:fontRef idx="minor">
-            <a:schemeClr val="lt1"/>
-          </a:fontRef>
-        </p:style>
-        <p:txBody>
-          <a:bodyPr rtlCol="0" anchor="ctr"/>
-          <a:lstStyle/>
-          <a:p>
-            <a:pPr algn="ctr"/>
-            <a:r>
-              <a:rPr lang="en-US" sz="1200" dirty="0" smtClean="0">
-                <a:solidFill>
-                  <a:schemeClr val="tx1"/>
-                </a:solidFill>
-              </a:rPr>
-              <a:t>D I-type</a:t>
-            </a:r>
-          </a:p>
-          <a:p>
-            <a:pPr algn="ctr"/>
-            <a:r>
-              <a:rPr lang="en-US" sz="1000" dirty="0" err="1" smtClean="0">
-                <a:solidFill>
-                  <a:schemeClr val="bg1"/>
-                </a:solidFill>
-              </a:rPr>
-              <a:t>Awrt</a:t>
-            </a:r>
-            <a:endParaRPr lang="en-US" sz="1000" dirty="0" smtClean="0">
-              <a:solidFill>
-                <a:schemeClr val="bg1"/>
-              </a:solidFill>
-            </a:endParaRPr>
-          </a:p>
-          <a:p>
-            <a:pPr algn="ctr"/>
-            <a:r>
-              <a:rPr lang="en-US" sz="1000" dirty="0" err="1" smtClean="0">
-                <a:solidFill>
-                  <a:schemeClr val="bg1"/>
-                </a:solidFill>
-              </a:rPr>
-              <a:t>Bwrt</a:t>
-            </a:r>
-            <a:endParaRPr lang="en-US" sz="1000" dirty="0" smtClean="0">
-              <a:solidFill>
-                <a:schemeClr val="bg1"/>
-              </a:solidFill>
-            </a:endParaRPr>
-          </a:p>
-          <a:p>
-            <a:pPr algn="ctr"/>
-            <a:r>
-              <a:rPr lang="en-US" sz="1000" dirty="0" err="1" smtClean="0">
-                <a:solidFill>
-                  <a:schemeClr val="bg1"/>
-                </a:solidFill>
-              </a:rPr>
-              <a:t>ior</a:t>
-            </a:r>
-            <a:endParaRPr lang="en-US" sz="1000" dirty="0">
-              <a:solidFill>
-                <a:schemeClr val="bg1"/>
-              </a:solidFill>
-            </a:endParaRPr>
-          </a:p>
-        </p:txBody>
-      </p:sp>
-      <p:sp>
-        <p:nvSpPr>
-          <p:cNvPr id="9" name="Oval 8"/>
-          <p:cNvSpPr/>
-          <p:nvPr/>
-        </p:nvSpPr>
-        <p:spPr>
-          <a:xfrm>
-            <a:off x="8935595" y="3446530"/>
-            <a:ext cx="992037" cy="992037"/>
-          </a:xfrm>
-          <a:prstGeom prst="ellipse">
-            <a:avLst/>
-          </a:prstGeom>
-          <a:solidFill>
-            <a:srgbClr val="0070C0"/>
-          </a:solidFill>
-          <a:ln>
-            <a:solidFill>
-              <a:schemeClr val="tx1"/>
-            </a:solidFill>
-          </a:ln>
-        </p:spPr>
-        <p:style>
-          <a:lnRef idx="2">
-            <a:schemeClr val="accent1">
-              <a:shade val="50000"/>
-            </a:schemeClr>
-          </a:lnRef>
-          <a:fillRef idx="1">
-            <a:schemeClr val="accent1"/>
-          </a:fillRef>
-          <a:effectRef idx="0">
-            <a:schemeClr val="accent1"/>
-          </a:effectRef>
-          <a:fontRef idx="minor">
-            <a:schemeClr val="lt1"/>
-          </a:fontRef>
-        </p:style>
-        <p:txBody>
-          <a:bodyPr rtlCol="0" anchor="ctr"/>
-          <a:lstStyle/>
-          <a:p>
-            <a:pPr algn="ctr"/>
-            <a:r>
-              <a:rPr lang="en-US" sz="1200" dirty="0" smtClean="0">
-                <a:solidFill>
-                  <a:schemeClr val="tx1"/>
-                </a:solidFill>
-              </a:rPr>
-              <a:t>E I-type</a:t>
-            </a:r>
-          </a:p>
-          <a:p>
-            <a:pPr algn="ctr"/>
-            <a:r>
-              <a:rPr lang="en-US" sz="1000" dirty="0" err="1" smtClean="0">
-                <a:solidFill>
-                  <a:schemeClr val="bg1"/>
-                </a:solidFill>
-              </a:rPr>
-              <a:t>ALUwrt</a:t>
-            </a:r>
-            <a:endParaRPr lang="en-US" sz="1000" dirty="0">
-              <a:solidFill>
-                <a:schemeClr val="bg1"/>
-              </a:solidFill>
-            </a:endParaRPr>
-          </a:p>
-        </p:txBody>
-      </p:sp>
-      <p:sp>
-        <p:nvSpPr>
-          <p:cNvPr id="10" name="Oval 9"/>
-          <p:cNvSpPr/>
-          <p:nvPr/>
-        </p:nvSpPr>
-        <p:spPr>
-          <a:xfrm>
-            <a:off x="10198122" y="3419923"/>
-            <a:ext cx="1039486" cy="1039486"/>
-          </a:xfrm>
-          <a:prstGeom prst="ellipse">
-            <a:avLst/>
-          </a:prstGeom>
-          <a:solidFill>
-            <a:srgbClr val="0070C0"/>
-          </a:solidFill>
-          <a:ln>
-            <a:solidFill>
-              <a:schemeClr val="tx1"/>
-            </a:solidFill>
-          </a:ln>
-        </p:spPr>
-        <p:style>
-          <a:lnRef idx="2">
-            <a:schemeClr val="accent1">
-              <a:shade val="50000"/>
-            </a:schemeClr>
-          </a:lnRef>
-          <a:fillRef idx="1">
-            <a:schemeClr val="accent1"/>
-          </a:fillRef>
-          <a:effectRef idx="0">
-            <a:schemeClr val="accent1"/>
-          </a:effectRef>
-          <a:fontRef idx="minor">
-            <a:schemeClr val="lt1"/>
-          </a:fontRef>
-        </p:style>
-        <p:txBody>
-          <a:bodyPr rtlCol="0" anchor="ctr"/>
-          <a:lstStyle/>
-          <a:p>
-            <a:pPr algn="ctr"/>
-            <a:r>
-              <a:rPr lang="en-US" sz="1050" dirty="0" smtClean="0">
-                <a:solidFill>
-                  <a:schemeClr val="tx1"/>
-                </a:solidFill>
-              </a:rPr>
-              <a:t>MR I-type</a:t>
-            </a:r>
-          </a:p>
-          <a:p>
-            <a:pPr algn="ctr"/>
-            <a:r>
-              <a:rPr lang="en-US" sz="1000" dirty="0" err="1" smtClean="0">
-                <a:solidFill>
-                  <a:schemeClr val="bg1"/>
-                </a:solidFill>
-              </a:rPr>
-              <a:t>regWrt</a:t>
-            </a:r>
-            <a:endParaRPr lang="en-US" sz="1000" dirty="0" smtClean="0">
-              <a:solidFill>
-                <a:schemeClr val="bg1"/>
-              </a:solidFill>
-            </a:endParaRPr>
-          </a:p>
-          <a:p>
-            <a:pPr algn="ctr"/>
-            <a:r>
-              <a:rPr lang="en-US" sz="1000" dirty="0" err="1" smtClean="0">
-                <a:solidFill>
-                  <a:schemeClr val="bg1"/>
-                </a:solidFill>
-              </a:rPr>
-              <a:t>wDate</a:t>
-            </a:r>
-            <a:r>
-              <a:rPr lang="en-US" sz="1000" dirty="0">
-                <a:solidFill>
-                  <a:schemeClr val="bg1"/>
-                </a:solidFill>
-              </a:rPr>
-              <a:t> </a:t>
-            </a:r>
-            <a:r>
-              <a:rPr lang="en-US" sz="1000" dirty="0" smtClean="0">
-                <a:solidFill>
-                  <a:schemeClr val="bg1"/>
-                </a:solidFill>
-              </a:rPr>
-              <a:t>= </a:t>
-            </a:r>
-            <a:r>
-              <a:rPr lang="en-US" sz="1000" dirty="0" err="1" smtClean="0">
-                <a:solidFill>
-                  <a:schemeClr val="bg1"/>
-                </a:solidFill>
-              </a:rPr>
-              <a:t>ALUout</a:t>
+              <a:t>01</a:t>
             </a:r>
             <a:endParaRPr lang="en-US" sz="1000" dirty="0">
               <a:solidFill>
@@ -3727,9 +3445,9 @@
           <p:nvPr/>
         </p:nvCxnSpPr>
         <p:spPr>
-          <a:xfrm>
-            <a:off x="9008814" y="1021963"/>
-            <a:ext cx="133675" cy="7357"/>
+          <a:xfrm flipV="1">
+            <a:off x="9008814" y="888618"/>
+            <a:ext cx="132821" cy="133345"/>
           </a:xfrm>
           <a:prstGeom prst="straightConnector1">
             <a:avLst/>
@@ -3760,15 +3478,15 @@
         <p:nvCxnSpPr>
           <p:cNvPr id="18" name="Straight Arrow Connector 17"/>
           <p:cNvCxnSpPr>
-            <a:stCxn id="4" idx="5"/>
+            <a:stCxn id="4" idx="6"/>
             <a:endCxn id="8" idx="2"/>
           </p:cNvCxnSpPr>
           <p:nvPr/>
         </p:nvCxnSpPr>
         <p:spPr>
           <a:xfrm>
-            <a:off x="6971511" y="3676221"/>
-            <a:ext cx="537782" cy="145280"/>
+            <a:off x="7116791" y="3325483"/>
+            <a:ext cx="794296" cy="129901"/>
           </a:xfrm>
           <a:prstGeom prst="straightConnector1">
             <a:avLst/>
@@ -3795,84 +3513,6 @@
           </a:fontRef>
         </p:style>
       </p:cxnSp>
-      <p:cxnSp>
-        <p:nvCxnSpPr>
-          <p:cNvPr id="20" name="Straight Arrow Connector 19"/>
-          <p:cNvCxnSpPr>
-            <a:stCxn id="8" idx="6"/>
-            <a:endCxn id="9" idx="2"/>
-          </p:cNvCxnSpPr>
-          <p:nvPr/>
-        </p:nvCxnSpPr>
-        <p:spPr>
-          <a:xfrm>
-            <a:off x="8501330" y="3821501"/>
-            <a:ext cx="434265" cy="121048"/>
-          </a:xfrm>
-          <a:prstGeom prst="straightConnector1">
-            <a:avLst/>
-          </a:prstGeom>
-          <a:ln>
-            <a:solidFill>
-              <a:schemeClr val="tx1"/>
-            </a:solidFill>
-            <a:tailEnd type="triangle"/>
-          </a:ln>
-        </p:spPr>
-        <p:style>
-          <a:lnRef idx="1">
-            <a:schemeClr val="accent1"/>
-          </a:lnRef>
-          <a:fillRef idx="0">
-            <a:schemeClr val="accent1"/>
-          </a:fillRef>
-          <a:effectRef idx="0">
-            <a:schemeClr val="accent1"/>
-          </a:effectRef>
-          <a:fontRef idx="minor">
-            <a:schemeClr val="tx1"/>
-          </a:fontRef>
-        </p:style>
-      </p:cxnSp>
-      <p:cxnSp>
-        <p:nvCxnSpPr>
-          <p:cNvPr id="23" name="Straight Arrow Connector 22"/>
-          <p:cNvCxnSpPr>
-            <a:stCxn id="9" idx="6"/>
-            <a:endCxn id="10" idx="2"/>
-          </p:cNvCxnSpPr>
-          <p:nvPr/>
-        </p:nvCxnSpPr>
-        <p:spPr>
-          <a:xfrm flipV="1">
-            <a:off x="9927632" y="3939666"/>
-            <a:ext cx="270490" cy="2883"/>
-          </a:xfrm>
-          <a:prstGeom prst="straightConnector1">
-            <a:avLst/>
-          </a:prstGeom>
-          <a:ln>
-            <a:solidFill>
-              <a:schemeClr val="tx1"/>
-            </a:solidFill>
-            <a:tailEnd type="triangle"/>
-          </a:ln>
-        </p:spPr>
-        <p:style>
-          <a:lnRef idx="1">
-            <a:schemeClr val="accent1"/>
-          </a:lnRef>
-          <a:fillRef idx="0">
-            <a:schemeClr val="accent1"/>
-          </a:fillRef>
-          <a:effectRef idx="0">
-            <a:schemeClr val="accent1"/>
-          </a:effectRef>
-          <a:fontRef idx="minor">
-            <a:schemeClr val="tx1"/>
-          </a:fontRef>
-        </p:style>
-      </p:cxnSp>
       <p:sp>
         <p:nvSpPr>
           <p:cNvPr id="26" name="Oval 25"/>
@@ -3881,8 +3521,8 @@
         </p:nvSpPr>
         <p:spPr>
           <a:xfrm>
-            <a:off x="6862209" y="4317519"/>
-            <a:ext cx="992037" cy="992037"/>
+            <a:off x="5444023" y="4272532"/>
+            <a:ext cx="742478" cy="742478"/>
           </a:xfrm>
           <a:prstGeom prst="ellipse">
             <a:avLst/>
@@ -3934,7 +3574,7 @@
                   <a:schemeClr val="bg1"/>
                 </a:solidFill>
               </a:rPr>
-              <a:t>jump</a:t>
+              <a:t>Jump = 01</a:t>
             </a:r>
             <a:endParaRPr lang="en-US" sz="1000" dirty="0">
               <a:solidFill>
@@ -3949,14 +3589,14 @@
           <p:cNvPr id="28" name="Straight Arrow Connector 27"/>
           <p:cNvCxnSpPr>
             <a:stCxn id="4" idx="4"/>
-            <a:endCxn id="26" idx="1"/>
+            <a:endCxn id="30" idx="1"/>
           </p:cNvCxnSpPr>
           <p:nvPr/>
         </p:nvCxnSpPr>
         <p:spPr>
           <a:xfrm>
             <a:off x="6620773" y="3821501"/>
-            <a:ext cx="386716" cy="641298"/>
+            <a:ext cx="259895" cy="440406"/>
           </a:xfrm>
           <a:prstGeom prst="straightConnector1">
             <a:avLst/>
@@ -3985,183 +3625,13 @@
       </p:cxnSp>
       <p:sp>
         <p:nvSpPr>
-          <p:cNvPr id="30" name="Oval 29"/>
-          <p:cNvSpPr/>
-          <p:nvPr/>
-        </p:nvSpPr>
-        <p:spPr>
-          <a:xfrm>
-            <a:off x="5501614" y="4204279"/>
-            <a:ext cx="1112396" cy="1112396"/>
-          </a:xfrm>
-          <a:prstGeom prst="ellipse">
-            <a:avLst/>
-          </a:prstGeom>
-          <a:solidFill>
-            <a:srgbClr val="00B050"/>
-          </a:solidFill>
-          <a:ln>
-            <a:solidFill>
-              <a:schemeClr val="tx1"/>
-            </a:solidFill>
-          </a:ln>
-        </p:spPr>
-        <p:style>
-          <a:lnRef idx="2">
-            <a:schemeClr val="accent1">
-              <a:shade val="50000"/>
-            </a:schemeClr>
-          </a:lnRef>
-          <a:fillRef idx="1">
-            <a:schemeClr val="accent1"/>
-          </a:fillRef>
-          <a:effectRef idx="0">
-            <a:schemeClr val="accent1"/>
-          </a:effectRef>
-          <a:fontRef idx="minor">
-            <a:schemeClr val="lt1"/>
-          </a:fontRef>
-        </p:style>
-        <p:txBody>
-          <a:bodyPr rtlCol="0" anchor="ctr"/>
-          <a:lstStyle/>
-          <a:p>
-            <a:pPr algn="ctr"/>
-            <a:r>
-              <a:rPr lang="en-US" sz="1200" dirty="0" smtClean="0">
-                <a:solidFill>
-                  <a:schemeClr val="tx1"/>
-                </a:solidFill>
-              </a:rPr>
-              <a:t>Branch</a:t>
-            </a:r>
-          </a:p>
-          <a:p>
-            <a:pPr algn="ctr"/>
-            <a:r>
-              <a:rPr lang="en-US" sz="1000" dirty="0" err="1" smtClean="0">
-                <a:solidFill>
-                  <a:schemeClr val="bg1"/>
-                </a:solidFill>
-              </a:rPr>
-              <a:t>Awrt</a:t>
-            </a:r>
-            <a:endParaRPr lang="en-US" sz="1000" dirty="0" smtClean="0">
-              <a:solidFill>
-                <a:schemeClr val="bg1"/>
-              </a:solidFill>
-            </a:endParaRPr>
-          </a:p>
-          <a:p>
-            <a:pPr algn="ctr"/>
-            <a:r>
-              <a:rPr lang="en-US" sz="1000" dirty="0" err="1" smtClean="0">
-                <a:solidFill>
-                  <a:schemeClr val="bg1"/>
-                </a:solidFill>
-              </a:rPr>
-              <a:t>Bwrt</a:t>
-            </a:r>
-            <a:endParaRPr lang="en-US" sz="1000" dirty="0" smtClean="0">
-              <a:solidFill>
-                <a:schemeClr val="bg1"/>
-              </a:solidFill>
-            </a:endParaRPr>
-          </a:p>
-          <a:p>
-            <a:pPr algn="ctr"/>
-            <a:r>
-              <a:rPr lang="en-US" sz="1000" dirty="0" err="1" smtClean="0"/>
-              <a:t>useFirstReg</a:t>
-            </a:r>
-            <a:endParaRPr lang="en-US" sz="1000" dirty="0">
-              <a:solidFill>
-                <a:schemeClr val="bg1"/>
-              </a:solidFill>
-            </a:endParaRPr>
-          </a:p>
-        </p:txBody>
-      </p:sp>
-      <p:sp>
-        <p:nvSpPr>
-          <p:cNvPr id="31" name="Oval 30"/>
-          <p:cNvSpPr/>
-          <p:nvPr/>
-        </p:nvSpPr>
-        <p:spPr>
-          <a:xfrm>
-            <a:off x="4669523" y="5167264"/>
-            <a:ext cx="992037" cy="992037"/>
-          </a:xfrm>
-          <a:prstGeom prst="ellipse">
-            <a:avLst/>
-          </a:prstGeom>
-          <a:solidFill>
-            <a:srgbClr val="00B050"/>
-          </a:solidFill>
-          <a:ln>
-            <a:solidFill>
-              <a:schemeClr val="tx1"/>
-            </a:solidFill>
-          </a:ln>
-        </p:spPr>
-        <p:style>
-          <a:lnRef idx="2">
-            <a:schemeClr val="accent1">
-              <a:shade val="50000"/>
-            </a:schemeClr>
-          </a:lnRef>
-          <a:fillRef idx="1">
-            <a:schemeClr val="accent1"/>
-          </a:fillRef>
-          <a:effectRef idx="0">
-            <a:schemeClr val="accent1"/>
-          </a:effectRef>
-          <a:fontRef idx="minor">
-            <a:schemeClr val="lt1"/>
-          </a:fontRef>
-        </p:style>
-        <p:txBody>
-          <a:bodyPr rtlCol="0" anchor="ctr"/>
-          <a:lstStyle/>
-          <a:p>
-            <a:pPr algn="ctr"/>
-            <a:r>
-              <a:rPr lang="en-US" sz="1200" dirty="0" smtClean="0">
-                <a:solidFill>
-                  <a:schemeClr val="tx1"/>
-                </a:solidFill>
-              </a:rPr>
-              <a:t>Branch</a:t>
-            </a:r>
-          </a:p>
-          <a:p>
-            <a:pPr algn="ctr"/>
-            <a:r>
-              <a:rPr lang="en-US" sz="1000" dirty="0" smtClean="0">
-                <a:solidFill>
-                  <a:schemeClr val="bg1"/>
-                </a:solidFill>
-              </a:rPr>
-              <a:t>branch</a:t>
-            </a:r>
-            <a:endParaRPr lang="en-US" sz="1000" dirty="0">
-              <a:solidFill>
-                <a:schemeClr val="bg1"/>
-              </a:solidFill>
-            </a:endParaRPr>
-          </a:p>
-        </p:txBody>
-      </p:sp>
-      <p:sp>
-        <p:nvSpPr>
           <p:cNvPr id="32" name="Oval 31"/>
           <p:cNvSpPr/>
           <p:nvPr/>
         </p:nvSpPr>
         <p:spPr>
           <a:xfrm>
-            <a:off x="4386755" y="3920707"/>
+            <a:off x="4316215" y="3870603"/>
             <a:ext cx="1084184" cy="1084184"/>
           </a:xfrm>
           <a:prstGeom prst="ellipse">
@@ -4220,48 +3690,43 @@
           <a:p>
             <a:pPr algn="ctr"/>
             <a:r>
-              <a:rPr lang="en-US" sz="1000" dirty="0" err="1" smtClean="0">
-                <a:solidFill>
-                  <a:schemeClr val="bg1"/>
+              <a:rPr lang="en-US" sz="1000" b="1" dirty="0" err="1" smtClean="0">
+                <a:solidFill>
+                  <a:srgbClr val="FF0000"/>
                 </a:solidFill>
               </a:rPr>
               <a:t>Awr</a:t>
             </a:r>
-            <a:endParaRPr lang="en-US" sz="1000" dirty="0" smtClean="0">
+            <a:endParaRPr lang="en-US" sz="1000" b="1" dirty="0" smtClean="0">
               <a:solidFill>
-                <a:schemeClr val="bg1"/>
+                <a:srgbClr val="FF0000"/>
               </a:solidFill>
             </a:endParaRPr>
           </a:p>
           <a:p>
             <a:pPr algn="ctr"/>
             <a:r>
-              <a:rPr lang="en-US" sz="1000" dirty="0" err="1" smtClean="0">
-                <a:solidFill>
-                  <a:schemeClr val="bg1"/>
+              <a:rPr lang="en-US" sz="1000" b="1" dirty="0" smtClean="0">
+                <a:solidFill>
+                  <a:srgbClr val="FF0000"/>
                 </a:solidFill>
               </a:rPr>
               <a:t>Bwrt</a:t>
             </a:r>
-            <a:endParaRPr lang="en-US" sz="1000" dirty="0" smtClean="0">
+          </a:p>
+          <a:p>
+            <a:pPr algn="ctr"/>
+            <a:r>
+              <a:rPr lang="en-US" sz="1000" b="1" dirty="0" err="1" smtClean="0">
+                <a:solidFill>
+                  <a:srgbClr val="FF0000"/>
+                </a:solidFill>
+              </a:rPr>
+              <a:t>imOrR</a:t>
+            </a:r>
+            <a:endParaRPr lang="en-US" sz="1000" b="1" dirty="0">
               <a:solidFill>
-                <a:schemeClr val="bg1"/>
-              </a:solidFill>
-            </a:endParaRPr>
-          </a:p>
-          <a:p>
-            <a:pPr algn="ctr"/>
-            <a:r>
-              <a:rPr lang="en-US" sz="1000" dirty="0" err="1" smtClean="0">
-                <a:solidFill>
-                  <a:schemeClr val="bg1"/>
-                </a:solidFill>
-              </a:rPr>
-              <a:t>ior</a:t>
-            </a:r>
-            <a:endParaRPr lang="en-US" sz="1000" dirty="0">
-              <a:solidFill>
-                <a:schemeClr val="bg1"/>
+                <a:srgbClr val="FF0000"/>
               </a:solidFill>
             </a:endParaRPr>
           </a:p>
@@ -4275,7 +3740,7 @@
         </p:nvSpPr>
         <p:spPr>
           <a:xfrm>
-            <a:off x="3305406" y="4915729"/>
+            <a:off x="2866005" y="4080270"/>
             <a:ext cx="1098292" cy="1098292"/>
           </a:xfrm>
           <a:prstGeom prst="ellipse">
@@ -4334,16 +3799,16 @@
           <a:p>
             <a:pPr algn="ctr"/>
             <a:r>
-              <a:rPr lang="en-US" sz="1000" dirty="0" err="1" smtClean="0">
-                <a:solidFill>
-                  <a:schemeClr val="bg1"/>
+              <a:rPr lang="en-US" sz="1000" b="1" dirty="0" err="1" smtClean="0">
+                <a:solidFill>
+                  <a:srgbClr val="FF0000"/>
                 </a:solidFill>
               </a:rPr>
               <a:t>ALUwrt</a:t>
             </a:r>
-            <a:endParaRPr lang="en-US" sz="1000" dirty="0">
+            <a:endParaRPr lang="en-US" sz="1000" b="1" dirty="0">
               <a:solidFill>
-                <a:schemeClr val="bg1"/>
+                <a:srgbClr val="FF0000"/>
               </a:solidFill>
             </a:endParaRPr>
           </a:p>
@@ -4357,8 +3822,8 @@
         </p:nvSpPr>
         <p:spPr>
           <a:xfrm>
-            <a:off x="1788805" y="4835942"/>
-            <a:ext cx="1257868" cy="1257866"/>
+            <a:off x="1443860" y="3991290"/>
+            <a:ext cx="1280188" cy="1280186"/>
           </a:xfrm>
           <a:prstGeom prst="ellipse">
             <a:avLst/>
@@ -4399,8 +3864,13 @@
                   <a:schemeClr val="tx1"/>
                 </a:solidFill>
               </a:rPr>
-              <a:t>MR1</a:t>
-            </a:r>
+              <a:t>MR</a:t>
+            </a:r>
+            <a:endParaRPr lang="en-US" sz="1400" dirty="0" smtClean="0">
+              <a:solidFill>
+                <a:schemeClr val="tx1"/>
+              </a:solidFill>
+            </a:endParaRPr>
           </a:p>
           <a:p>
             <a:pPr algn="ctr"/>
@@ -4416,16 +3886,16 @@
           <a:p>
             <a:pPr algn="ctr"/>
             <a:r>
-              <a:rPr lang="en-US" sz="1000" dirty="0" err="1" smtClean="0">
-                <a:solidFill>
-                  <a:schemeClr val="bg1"/>
+              <a:rPr lang="en-US" sz="1000" b="1" dirty="0" err="1" smtClean="0">
+                <a:solidFill>
+                  <a:srgbClr val="FF0000"/>
                 </a:solidFill>
               </a:rPr>
               <a:t>memADrsSlct</a:t>
             </a:r>
-            <a:endParaRPr lang="en-US" sz="1000" dirty="0">
+            <a:endParaRPr lang="en-US" sz="1000" b="1" dirty="0">
               <a:solidFill>
-                <a:schemeClr val="bg1"/>
+                <a:srgbClr val="FF0000"/>
               </a:solidFill>
             </a:endParaRPr>
           </a:p>
@@ -4439,7 +3909,7 @@
         </p:nvSpPr>
         <p:spPr>
           <a:xfrm>
-            <a:off x="448723" y="4893323"/>
+            <a:off x="129042" y="4057864"/>
             <a:ext cx="1143103" cy="1143103"/>
           </a:xfrm>
           <a:prstGeom prst="ellipse">
@@ -4476,13 +3946,18 @@
           <a:p>
             <a:pPr algn="ctr"/>
             <a:r>
-              <a:rPr lang="en-US" sz="1400" dirty="0" smtClean="0">
+              <a:rPr lang="en-US" sz="1400" dirty="0">
                 <a:solidFill>
                   <a:schemeClr val="tx1"/>
                 </a:solidFill>
               </a:rPr>
-              <a:t>MR2</a:t>
-            </a:r>
+              <a:t>W</a:t>
+            </a:r>
+            <a:endParaRPr lang="en-US" sz="1400" dirty="0" smtClean="0">
+              <a:solidFill>
+                <a:schemeClr val="tx1"/>
+              </a:solidFill>
+            </a:endParaRPr>
           </a:p>
           <a:p>
             <a:pPr algn="ctr"/>
@@ -4498,48 +3973,48 @@
           <a:p>
             <a:pPr algn="ctr"/>
             <a:r>
-              <a:rPr lang="en-US" sz="1000" dirty="0" err="1" smtClean="0">
-                <a:solidFill>
-                  <a:schemeClr val="bg1"/>
+              <a:rPr lang="en-US" sz="1000" b="1" dirty="0" err="1" smtClean="0">
+                <a:solidFill>
+                  <a:srgbClr val="FF0000"/>
                 </a:solidFill>
               </a:rPr>
               <a:t>regWrt</a:t>
             </a:r>
-            <a:endParaRPr lang="en-US" sz="1000" dirty="0" smtClean="0">
+            <a:endParaRPr lang="en-US" sz="1000" b="1" dirty="0" smtClean="0">
               <a:solidFill>
-                <a:schemeClr val="bg1"/>
+                <a:srgbClr val="FF0000"/>
               </a:solidFill>
             </a:endParaRPr>
           </a:p>
           <a:p>
             <a:pPr algn="ctr"/>
             <a:r>
-              <a:rPr lang="en-US" sz="1000" dirty="0" err="1" smtClean="0">
-                <a:solidFill>
-                  <a:schemeClr val="bg1"/>
+              <a:rPr lang="en-US" sz="1000" b="1" dirty="0" err="1" smtClean="0">
+                <a:solidFill>
+                  <a:srgbClr val="FF0000"/>
                 </a:solidFill>
               </a:rPr>
               <a:t>wDat</a:t>
             </a:r>
             <a:r>
-              <a:rPr lang="en-US" sz="1000" dirty="0" smtClean="0">
-                <a:solidFill>
-                  <a:schemeClr val="bg1"/>
+              <a:rPr lang="en-US" sz="1000" b="1" dirty="0" smtClean="0">
+                <a:solidFill>
+                  <a:srgbClr val="FF0000"/>
                 </a:solidFill>
               </a:rPr>
               <a:t> = </a:t>
             </a:r>
             <a:r>
-              <a:rPr lang="en-US" sz="1000" dirty="0" err="1" smtClean="0">
-                <a:solidFill>
-                  <a:schemeClr val="bg1"/>
+              <a:rPr lang="en-US" sz="1000" b="1" dirty="0" smtClean="0">
+                <a:solidFill>
+                  <a:srgbClr val="FF0000"/>
                 </a:solidFill>
               </a:rPr>
-              <a:t>memOut</a:t>
-            </a:r>
-            <a:endParaRPr lang="en-US" sz="1000" dirty="0">
+              <a:t>00</a:t>
+            </a:r>
+            <a:endParaRPr lang="en-US" sz="1000" b="1" dirty="0">
               <a:solidFill>
-                <a:schemeClr val="bg1"/>
+                <a:srgbClr val="FF0000"/>
               </a:solidFill>
             </a:endParaRPr>
           </a:p>
@@ -4556,8 +4031,8 @@
         </p:nvCxnSpPr>
         <p:spPr>
           <a:xfrm flipH="1">
-            <a:off x="5312164" y="3676221"/>
-            <a:ext cx="957870" cy="403261"/>
+            <a:off x="5241624" y="3676221"/>
+            <a:ext cx="1028410" cy="353157"/>
           </a:xfrm>
           <a:prstGeom prst="straightConnector1">
             <a:avLst/>
@@ -4588,15 +4063,15 @@
         <p:nvCxnSpPr>
           <p:cNvPr id="41" name="Straight Arrow Connector 40"/>
           <p:cNvCxnSpPr>
-            <a:stCxn id="32" idx="3"/>
-            <a:endCxn id="33" idx="7"/>
+            <a:stCxn id="32" idx="2"/>
+            <a:endCxn id="33" idx="6"/>
           </p:cNvCxnSpPr>
           <p:nvPr/>
         </p:nvCxnSpPr>
         <p:spPr>
           <a:xfrm flipH="1">
-            <a:off x="4242857" y="4846116"/>
-            <a:ext cx="302673" cy="230454"/>
+            <a:off x="3964297" y="4412695"/>
+            <a:ext cx="351918" cy="216721"/>
           </a:xfrm>
           <a:prstGeom prst="straightConnector1">
             <a:avLst/>
@@ -4634,8 +4109,8 @@
         </p:nvCxnSpPr>
         <p:spPr>
           <a:xfrm flipH="1">
-            <a:off x="3046673" y="5464875"/>
-            <a:ext cx="258733" cy="0"/>
+            <a:off x="2724048" y="4629416"/>
+            <a:ext cx="141957" cy="1967"/>
           </a:xfrm>
           <a:prstGeom prst="straightConnector1">
             <a:avLst/>
@@ -4672,9 +4147,9 @@
           <p:nvPr/>
         </p:nvCxnSpPr>
         <p:spPr>
-          <a:xfrm flipH="1">
-            <a:off x="1591826" y="5464875"/>
-            <a:ext cx="196979" cy="0"/>
+          <a:xfrm flipH="1" flipV="1">
+            <a:off x="1272145" y="4629416"/>
+            <a:ext cx="171715" cy="1967"/>
           </a:xfrm>
           <a:prstGeom prst="straightConnector1">
             <a:avLst/>
@@ -4768,46 +4243,41 @@
           <a:p>
             <a:pPr algn="ctr"/>
             <a:r>
-              <a:rPr lang="en-US" sz="1000" dirty="0" err="1" smtClean="0">
-                <a:solidFill>
-                  <a:schemeClr val="bg1"/>
+              <a:rPr lang="en-US" sz="1000" b="1" dirty="0" err="1" smtClean="0">
+                <a:solidFill>
+                  <a:srgbClr val="FF0000"/>
                 </a:solidFill>
               </a:rPr>
               <a:t>Awr</a:t>
             </a:r>
-            <a:endParaRPr lang="en-US" sz="1000" dirty="0" smtClean="0">
+            <a:endParaRPr lang="en-US" sz="1000" b="1" dirty="0" smtClean="0">
               <a:solidFill>
-                <a:schemeClr val="bg1"/>
+                <a:srgbClr val="FF0000"/>
               </a:solidFill>
             </a:endParaRPr>
           </a:p>
           <a:p>
             <a:pPr algn="ctr"/>
             <a:r>
-              <a:rPr lang="en-US" sz="1000" dirty="0" err="1" smtClean="0">
-                <a:solidFill>
-                  <a:schemeClr val="bg1"/>
+              <a:rPr lang="en-US" sz="1000" b="1" dirty="0" smtClean="0">
+                <a:solidFill>
+                  <a:srgbClr val="FF0000"/>
                 </a:solidFill>
               </a:rPr>
               <a:t>Bwrt</a:t>
             </a:r>
-            <a:endParaRPr lang="en-US" sz="1000" dirty="0" smtClean="0">
-              <a:solidFill>
-                <a:schemeClr val="bg1"/>
-              </a:solidFill>
-            </a:endParaRPr>
           </a:p>
           <a:p>
             <a:pPr algn="ctr"/>
             <a:r>
-              <a:rPr lang="en-US" sz="1000" dirty="0" err="1" smtClean="0">
-                <a:solidFill>
-                  <a:schemeClr val="bg1"/>
+              <a:rPr lang="en-US" sz="1000" b="1" dirty="0" err="1">
+                <a:solidFill>
+                  <a:srgbClr val="FF0000"/>
                 </a:solidFill>
               </a:rPr>
-              <a:t>ior</a:t>
-            </a:r>
-            <a:endParaRPr lang="en-US" sz="1000" dirty="0" smtClean="0">
+              <a:t>imOrR</a:t>
+            </a:r>
+            <a:endParaRPr lang="en-US" sz="1000" b="1" dirty="0" smtClean="0">
               <a:solidFill>
                 <a:schemeClr val="bg1"/>
               </a:solidFill>
@@ -4882,16 +4352,16 @@
           <a:p>
             <a:pPr algn="ctr"/>
             <a:r>
-              <a:rPr lang="en-US" sz="1000" dirty="0" err="1" smtClean="0">
-                <a:solidFill>
-                  <a:schemeClr val="bg1"/>
+              <a:rPr lang="en-US" sz="1000" b="1" dirty="0" err="1" smtClean="0">
+                <a:solidFill>
+                  <a:srgbClr val="FF0000"/>
                 </a:solidFill>
               </a:rPr>
               <a:t>ALUwrt</a:t>
             </a:r>
-            <a:endParaRPr lang="en-US" sz="1200" dirty="0">
+            <a:endParaRPr lang="en-US" sz="1200" b="1" dirty="0">
               <a:solidFill>
-                <a:schemeClr val="bg1"/>
+                <a:srgbClr val="FF0000"/>
               </a:solidFill>
             </a:endParaRPr>
           </a:p>
@@ -4964,32 +4434,32 @@
           <a:p>
             <a:pPr algn="ctr"/>
             <a:r>
-              <a:rPr lang="en-US" sz="1100" dirty="0" err="1" smtClean="0">
-                <a:solidFill>
-                  <a:schemeClr val="bg1"/>
+              <a:rPr lang="en-US" sz="1100" b="1" dirty="0" err="1" smtClean="0">
+                <a:solidFill>
+                  <a:srgbClr val="FF0000"/>
                 </a:solidFill>
               </a:rPr>
               <a:t>memAdrsSlct</a:t>
             </a:r>
-            <a:endParaRPr lang="en-US" sz="1100" dirty="0" smtClean="0">
+            <a:endParaRPr lang="en-US" sz="1100" b="1" dirty="0" smtClean="0">
               <a:solidFill>
-                <a:schemeClr val="bg1"/>
+                <a:srgbClr val="FF0000"/>
               </a:solidFill>
             </a:endParaRPr>
           </a:p>
           <a:p>
             <a:pPr algn="ctr"/>
             <a:r>
-              <a:rPr lang="en-US" sz="1100" dirty="0" err="1" smtClean="0">
-                <a:solidFill>
-                  <a:schemeClr val="bg1"/>
+              <a:rPr lang="en-US" sz="1100" b="1" dirty="0" err="1" smtClean="0">
+                <a:solidFill>
+                  <a:srgbClr val="FF0000"/>
                 </a:solidFill>
               </a:rPr>
               <a:t>memWrt</a:t>
             </a:r>
-            <a:endParaRPr lang="en-US" sz="1600" dirty="0">
+            <a:endParaRPr lang="en-US" sz="1600" b="1" dirty="0">
               <a:solidFill>
-                <a:schemeClr val="bg1"/>
+                <a:srgbClr val="FF0000"/>
               </a:solidFill>
             </a:endParaRPr>
           </a:p>
@@ -5115,52 +4585,16 @@
       <p:cxnSp>
         <p:nvCxnSpPr>
           <p:cNvPr id="81" name="Straight Arrow Connector 80"/>
-          <p:cNvCxnSpPr/>
-          <p:nvPr/>
-        </p:nvCxnSpPr>
-        <p:spPr>
-          <a:xfrm flipH="1">
-            <a:off x="6350283" y="3847817"/>
-            <a:ext cx="174161" cy="463330"/>
-          </a:xfrm>
-          <a:prstGeom prst="straightConnector1">
-            <a:avLst/>
-          </a:prstGeom>
-          <a:ln>
-            <a:solidFill>
-              <a:schemeClr val="tx1"/>
-            </a:solidFill>
-            <a:tailEnd type="triangle"/>
-          </a:ln>
-        </p:spPr>
-        <p:style>
-          <a:lnRef idx="1">
-            <a:schemeClr val="accent1"/>
-          </a:lnRef>
-          <a:fillRef idx="0">
-            <a:schemeClr val="accent1"/>
-          </a:fillRef>
-          <a:effectRef idx="0">
-            <a:schemeClr val="accent1"/>
-          </a:effectRef>
-          <a:fontRef idx="minor">
-            <a:schemeClr val="tx1"/>
-          </a:fontRef>
-        </p:style>
-      </p:cxnSp>
-      <p:cxnSp>
-        <p:nvCxnSpPr>
-          <p:cNvPr id="83" name="Straight Arrow Connector 82"/>
           <p:cNvCxnSpPr>
-            <a:stCxn id="30" idx="3"/>
-            <a:endCxn id="31" idx="7"/>
+            <a:stCxn id="4" idx="3"/>
+            <a:endCxn id="26" idx="7"/>
           </p:cNvCxnSpPr>
           <p:nvPr/>
         </p:nvCxnSpPr>
         <p:spPr>
           <a:xfrm flipH="1">
-            <a:off x="5516280" y="5153768"/>
-            <a:ext cx="148241" cy="158776"/>
+            <a:off x="6077768" y="3676221"/>
+            <a:ext cx="192266" cy="705044"/>
           </a:xfrm>
           <a:prstGeom prst="straightConnector1">
             <a:avLst/>
@@ -5270,14 +4704,14 @@
           <a:p>
             <a:pPr algn="ctr"/>
             <a:r>
-              <a:rPr lang="en-US" sz="1000" dirty="0" err="1" smtClean="0">
+              <a:rPr lang="en-US" sz="1000" b="1" dirty="0" err="1" smtClean="0">
                 <a:solidFill>
                   <a:schemeClr val="bg1"/>
                 </a:solidFill>
               </a:rPr>
               <a:t>regWrt</a:t>
             </a:r>
-            <a:endParaRPr lang="en-US" sz="1000" dirty="0" smtClean="0">
+            <a:endParaRPr lang="en-US" sz="1000" b="1" dirty="0" smtClean="0">
               <a:solidFill>
                 <a:schemeClr val="bg1"/>
               </a:solidFill>
@@ -5286,7 +4720,7 @@
           <a:p>
             <a:pPr algn="ctr"/>
             <a:r>
-              <a:rPr lang="en-US" sz="1000" dirty="0" err="1" smtClean="0">
+              <a:rPr lang="en-US" sz="1000" b="1" dirty="0" err="1" smtClean="0">
                 <a:solidFill>
                   <a:schemeClr val="bg1"/>
                 </a:solidFill>
@@ -5294,30 +4728,22 @@
               <a:t>wDat</a:t>
             </a:r>
             <a:r>
-              <a:rPr lang="en-US" sz="1000" dirty="0" smtClean="0">
+              <a:rPr lang="en-US" sz="1000" b="1" dirty="0" smtClean="0">
                 <a:solidFill>
                   <a:schemeClr val="bg1"/>
                 </a:solidFill>
               </a:rPr>
-              <a:t> = SE[</a:t>
-            </a:r>
-            <a:r>
-              <a:rPr lang="en-US" sz="1000" dirty="0" err="1" smtClean="0">
+              <a:t> = </a:t>
+            </a:r>
+            <a:r>
+              <a:rPr lang="en-US" sz="1000" b="1" dirty="0" smtClean="0">
                 <a:solidFill>
                   <a:schemeClr val="bg1"/>
                 </a:solidFill>
               </a:rPr>
-              <a:t>imm</a:t>
-            </a:r>
-            <a:r>
-              <a:rPr lang="en-US" sz="1000" dirty="0" smtClean="0">
-                <a:solidFill>
-                  <a:schemeClr val="bg1"/>
-                </a:solidFill>
-              </a:rPr>
-              <a:t>]</a:t>
-            </a:r>
-            <a:endParaRPr lang="en-US" sz="1000" dirty="0">
+              <a:t>11</a:t>
+            </a:r>
+            <a:endParaRPr lang="en-US" sz="1000" b="1" dirty="0">
               <a:solidFill>
                 <a:schemeClr val="bg1"/>
               </a:solidFill>
@@ -5475,7 +4901,7 @@
         </p:nvSpPr>
         <p:spPr>
           <a:xfrm>
-            <a:off x="6038488" y="97815"/>
+            <a:off x="6038488" y="-31770"/>
             <a:ext cx="1164568" cy="1164566"/>
           </a:xfrm>
           <a:prstGeom prst="ellipse">
@@ -5571,12 +4997,12 @@
               <a:t> = </a:t>
             </a:r>
             <a:r>
-              <a:rPr lang="en-US" sz="1000" dirty="0" err="1" smtClean="0">
+              <a:rPr lang="en-US" sz="1000" dirty="0" smtClean="0">
                 <a:solidFill>
                   <a:schemeClr val="bg1"/>
                 </a:solidFill>
               </a:rPr>
-              <a:t>AiA</a:t>
+              <a:t>10</a:t>
             </a:r>
             <a:endParaRPr lang="en-US" sz="1000" dirty="0">
               <a:solidFill>
@@ -5636,8 +5062,8 @@
         </p:nvCxnSpPr>
         <p:spPr>
           <a:xfrm flipV="1">
-            <a:off x="6610042" y="1262381"/>
-            <a:ext cx="10730" cy="167654"/>
+            <a:off x="6610042" y="1132796"/>
+            <a:ext cx="10730" cy="297239"/>
           </a:xfrm>
           <a:prstGeom prst="straightConnector1">
             <a:avLst/>
@@ -5666,109 +5092,13 @@
       </p:cxnSp>
       <p:sp>
         <p:nvSpPr>
-          <p:cNvPr id="132" name="Oval 131"/>
-          <p:cNvSpPr/>
-          <p:nvPr/>
-        </p:nvSpPr>
-        <p:spPr>
-          <a:xfrm>
-            <a:off x="9975709" y="5458454"/>
-            <a:ext cx="914400" cy="914400"/>
-          </a:xfrm>
-          <a:prstGeom prst="ellipse">
-            <a:avLst/>
-          </a:prstGeom>
-          <a:ln>
-            <a:solidFill>
-              <a:schemeClr val="tx1"/>
-            </a:solidFill>
-          </a:ln>
-        </p:spPr>
-        <p:style>
-          <a:lnRef idx="2">
-            <a:schemeClr val="accent1">
-              <a:shade val="50000"/>
-            </a:schemeClr>
-          </a:lnRef>
-          <a:fillRef idx="1">
-            <a:schemeClr val="accent1"/>
-          </a:fillRef>
-          <a:effectRef idx="0">
-            <a:schemeClr val="accent1"/>
-          </a:effectRef>
-          <a:fontRef idx="minor">
-            <a:schemeClr val="lt1"/>
-          </a:fontRef>
-        </p:style>
-        <p:txBody>
-          <a:bodyPr rtlCol="0" anchor="ctr"/>
-          <a:lstStyle/>
-          <a:p>
-            <a:pPr algn="ctr"/>
-            <a:r>
-              <a:rPr lang="en-US" sz="1000" dirty="0" smtClean="0"/>
-              <a:t>Micah’s Magic Bit </a:t>
-            </a:r>
-            <a:r>
-              <a:rPr lang="en-US" sz="1000" dirty="0" err="1" smtClean="0"/>
-              <a:t>Factoryu</a:t>
-            </a:r>
-            <a:endParaRPr lang="en-US" sz="1000" dirty="0"/>
-          </a:p>
-        </p:txBody>
-      </p:sp>
-      <p:cxnSp>
-        <p:nvCxnSpPr>
-          <p:cNvPr id="134" name="Elbow Connector 133"/>
-          <p:cNvCxnSpPr>
-            <a:stCxn id="132" idx="6"/>
-            <a:endCxn id="132" idx="2"/>
-          </p:cNvCxnSpPr>
-          <p:nvPr/>
-        </p:nvCxnSpPr>
-        <p:spPr>
-          <a:xfrm flipH="1">
-            <a:off x="9975709" y="5915654"/>
-            <a:ext cx="914400" cy="12700"/>
-          </a:xfrm>
-          <a:prstGeom prst="bentConnector5">
-            <a:avLst>
-              <a:gd name="adj1" fmla="val -25000"/>
-              <a:gd name="adj2" fmla="val 5400000"/>
-              <a:gd name="adj3" fmla="val 125000"/>
-            </a:avLst>
-          </a:prstGeom>
-          <a:ln>
-            <a:solidFill>
-              <a:schemeClr val="tx1"/>
-            </a:solidFill>
-            <a:tailEnd type="triangle"/>
-          </a:ln>
-        </p:spPr>
-        <p:style>
-          <a:lnRef idx="1">
-            <a:schemeClr val="accent1"/>
-          </a:lnRef>
-          <a:fillRef idx="0">
-            <a:schemeClr val="accent1"/>
-          </a:fillRef>
-          <a:effectRef idx="0">
-            <a:schemeClr val="accent1"/>
-          </a:effectRef>
-          <a:fontRef idx="minor">
-            <a:schemeClr val="tx1"/>
-          </a:fontRef>
-        </p:style>
-      </p:cxnSp>
-      <p:sp>
-        <p:nvSpPr>
-          <p:cNvPr id="135" name="TextBox 134"/>
+          <p:cNvPr id="136" name="TextBox 135"/>
           <p:cNvSpPr txBox="1"/>
           <p:nvPr/>
         </p:nvSpPr>
         <p:spPr>
           <a:xfrm>
-            <a:off x="11487463" y="3755000"/>
+            <a:off x="10542610" y="318234"/>
             <a:ext cx="694998" cy="369332"/>
           </a:xfrm>
           <a:prstGeom prst="rect">
@@ -5797,13 +5127,13 @@
       </p:sp>
       <p:sp>
         <p:nvSpPr>
-          <p:cNvPr id="136" name="TextBox 135"/>
+          <p:cNvPr id="137" name="TextBox 136"/>
           <p:cNvSpPr txBox="1"/>
           <p:nvPr/>
         </p:nvSpPr>
         <p:spPr>
           <a:xfrm>
-            <a:off x="10542610" y="318234"/>
+            <a:off x="4670260" y="270621"/>
             <a:ext cx="694998" cy="369332"/>
           </a:xfrm>
           <a:prstGeom prst="rect">
@@ -5832,13 +5162,13 @@
       </p:sp>
       <p:sp>
         <p:nvSpPr>
-          <p:cNvPr id="137" name="TextBox 136"/>
+          <p:cNvPr id="138" name="TextBox 137"/>
           <p:cNvSpPr txBox="1"/>
           <p:nvPr/>
         </p:nvSpPr>
         <p:spPr>
           <a:xfrm>
-            <a:off x="4670260" y="270621"/>
+            <a:off x="3062182" y="1598845"/>
             <a:ext cx="694998" cy="369332"/>
           </a:xfrm>
           <a:prstGeom prst="rect">
@@ -5867,13 +5197,13 @@
       </p:sp>
       <p:sp>
         <p:nvSpPr>
-          <p:cNvPr id="138" name="TextBox 137"/>
+          <p:cNvPr id="139" name="TextBox 138"/>
           <p:cNvSpPr txBox="1"/>
           <p:nvPr/>
         </p:nvSpPr>
         <p:spPr>
           <a:xfrm>
-            <a:off x="3062182" y="1598845"/>
+            <a:off x="323861" y="3084163"/>
             <a:ext cx="694998" cy="369332"/>
           </a:xfrm>
           <a:prstGeom prst="rect">
@@ -5902,13 +5232,13 @@
       </p:sp>
       <p:sp>
         <p:nvSpPr>
-          <p:cNvPr id="139" name="TextBox 138"/>
+          <p:cNvPr id="140" name="TextBox 139"/>
           <p:cNvSpPr txBox="1"/>
           <p:nvPr/>
         </p:nvSpPr>
         <p:spPr>
           <a:xfrm>
-            <a:off x="323861" y="3084163"/>
+            <a:off x="333901" y="3501271"/>
             <a:ext cx="694998" cy="369332"/>
           </a:xfrm>
           <a:prstGeom prst="rect">
@@ -5937,13 +5267,13 @@
       </p:sp>
       <p:sp>
         <p:nvSpPr>
-          <p:cNvPr id="140" name="TextBox 139"/>
+          <p:cNvPr id="142" name="TextBox 141"/>
           <p:cNvSpPr txBox="1"/>
           <p:nvPr/>
         </p:nvSpPr>
         <p:spPr>
           <a:xfrm>
-            <a:off x="672775" y="4215601"/>
+            <a:off x="4890057" y="5083429"/>
             <a:ext cx="694998" cy="369332"/>
           </a:xfrm>
           <a:prstGeom prst="rect">
@@ -5970,128 +5300,19 @@
           </a:p>
         </p:txBody>
       </p:sp>
-      <p:sp>
-        <p:nvSpPr>
-          <p:cNvPr id="141" name="TextBox 140"/>
-          <p:cNvSpPr txBox="1"/>
-          <p:nvPr/>
-        </p:nvSpPr>
-        <p:spPr>
-          <a:xfrm>
-            <a:off x="3902232" y="6055741"/>
-            <a:ext cx="694998" cy="369332"/>
-          </a:xfrm>
-          <a:prstGeom prst="rect">
-            <a:avLst/>
-          </a:prstGeom>
-          <a:noFill/>
-          <a:ln>
-            <a:solidFill>
-              <a:schemeClr val="tx1"/>
-            </a:solidFill>
-          </a:ln>
-        </p:spPr>
-        <p:txBody>
-          <a:bodyPr wrap="none" rtlCol="0">
-            <a:spAutoFit/>
-          </a:bodyPr>
-          <a:lstStyle/>
-          <a:p>
-            <a:r>
-              <a:rPr lang="en-US" dirty="0" smtClean="0"/>
-              <a:t>Fetch</a:t>
-            </a:r>
-            <a:endParaRPr lang="en-US" dirty="0"/>
-          </a:p>
-        </p:txBody>
-      </p:sp>
-      <p:sp>
-        <p:nvSpPr>
-          <p:cNvPr id="142" name="TextBox 141"/>
-          <p:cNvSpPr txBox="1"/>
-          <p:nvPr/>
-        </p:nvSpPr>
-        <p:spPr>
-          <a:xfrm>
-            <a:off x="8183621" y="4640098"/>
-            <a:ext cx="694998" cy="369332"/>
-          </a:xfrm>
-          <a:prstGeom prst="rect">
-            <a:avLst/>
-          </a:prstGeom>
-          <a:noFill/>
-          <a:ln>
-            <a:solidFill>
-              <a:schemeClr val="tx1"/>
-            </a:solidFill>
-          </a:ln>
-        </p:spPr>
-        <p:txBody>
-          <a:bodyPr wrap="none" rtlCol="0">
-            <a:spAutoFit/>
-          </a:bodyPr>
-          <a:lstStyle/>
-          <a:p>
-            <a:r>
-              <a:rPr lang="en-US" dirty="0" smtClean="0"/>
-              <a:t>Fetch</a:t>
-            </a:r>
-            <a:endParaRPr lang="en-US" dirty="0"/>
-          </a:p>
-        </p:txBody>
-      </p:sp>
       <p:cxnSp>
         <p:nvCxnSpPr>
           <p:cNvPr id="144" name="Straight Arrow Connector 143"/>
           <p:cNvCxnSpPr>
-            <a:stCxn id="26" idx="6"/>
-            <a:endCxn id="142" idx="1"/>
+            <a:stCxn id="26" idx="3"/>
+            <a:endCxn id="142" idx="0"/>
           </p:cNvCxnSpPr>
           <p:nvPr/>
         </p:nvCxnSpPr>
         <p:spPr>
-          <a:xfrm>
-            <a:off x="7854246" y="4813538"/>
-            <a:ext cx="329375" cy="11226"/>
-          </a:xfrm>
-          <a:prstGeom prst="straightConnector1">
-            <a:avLst/>
-          </a:prstGeom>
-          <a:ln>
-            <a:solidFill>
-              <a:schemeClr val="tx1"/>
-            </a:solidFill>
-            <a:tailEnd type="triangle"/>
-          </a:ln>
-        </p:spPr>
-        <p:style>
-          <a:lnRef idx="1">
-            <a:schemeClr val="accent1"/>
-          </a:lnRef>
-          <a:fillRef idx="0">
-            <a:schemeClr val="accent1"/>
-          </a:fillRef>
-          <a:effectRef idx="0">
-            <a:schemeClr val="accent1"/>
-          </a:effectRef>
-          <a:fontRef idx="minor">
-            <a:schemeClr val="tx1"/>
-          </a:fontRef>
-        </p:style>
-      </p:cxnSp>
-      <p:cxnSp>
-        <p:nvCxnSpPr>
-          <p:cNvPr id="146" name="Straight Arrow Connector 145"/>
-          <p:cNvCxnSpPr>
-            <a:stCxn id="31" idx="3"/>
-            <a:endCxn id="141" idx="3"/>
-          </p:cNvCxnSpPr>
-          <p:nvPr/>
-        </p:nvCxnSpPr>
-        <p:spPr>
           <a:xfrm flipH="1">
-            <a:off x="4597230" y="6014021"/>
-            <a:ext cx="217573" cy="226386"/>
+            <a:off x="5237556" y="4906277"/>
+            <a:ext cx="315200" cy="177152"/>
           </a:xfrm>
           <a:prstGeom prst="straightConnector1">
             <a:avLst/>
@@ -6129,8 +5350,8 @@
         </p:nvCxnSpPr>
         <p:spPr>
           <a:xfrm flipH="1" flipV="1">
-            <a:off x="1020274" y="4584933"/>
-            <a:ext cx="1" cy="308390"/>
+            <a:off x="681400" y="3870603"/>
+            <a:ext cx="19194" cy="187261"/>
           </a:xfrm>
           <a:prstGeom prst="straightConnector1">
             <a:avLst/>
@@ -6247,7 +5468,7 @@
         <p:spPr>
           <a:xfrm flipH="1" flipV="1">
             <a:off x="5365258" y="455287"/>
-            <a:ext cx="673230" cy="224811"/>
+            <a:ext cx="673230" cy="95226"/>
           </a:xfrm>
           <a:prstGeom prst="straightConnector1">
             <a:avLst/>
@@ -6285,8 +5506,8 @@
         </p:nvCxnSpPr>
         <p:spPr>
           <a:xfrm flipV="1">
-            <a:off x="10062877" y="502900"/>
-            <a:ext cx="479733" cy="145183"/>
+            <a:off x="10062023" y="502900"/>
+            <a:ext cx="480587" cy="4481"/>
           </a:xfrm>
           <a:prstGeom prst="straightConnector1">
             <a:avLst/>
@@ -6313,19 +5534,1680 @@
           </a:fontRef>
         </p:style>
       </p:cxnSp>
+      <p:sp>
+        <p:nvSpPr>
+          <p:cNvPr id="2" name="TextBox 1"/>
+          <p:cNvSpPr txBox="1"/>
+          <p:nvPr/>
+        </p:nvSpPr>
+        <p:spPr>
+          <a:xfrm>
+            <a:off x="6433293" y="2521964"/>
+            <a:ext cx="769763" cy="369332"/>
+          </a:xfrm>
+          <a:prstGeom prst="rect">
+            <a:avLst/>
+          </a:prstGeom>
+          <a:noFill/>
+          <a:ln>
+            <a:solidFill>
+              <a:schemeClr val="tx1"/>
+            </a:solidFill>
+          </a:ln>
+        </p:spPr>
+        <p:txBody>
+          <a:bodyPr wrap="none" rtlCol="0">
+            <a:spAutoFit/>
+          </a:bodyPr>
+          <a:lstStyle/>
+          <a:p>
+            <a:r>
+              <a:rPr lang="en-US" dirty="0" smtClean="0"/>
+              <a:t>00000</a:t>
+            </a:r>
+            <a:endParaRPr lang="en-US" dirty="0"/>
+          </a:p>
+        </p:txBody>
+      </p:sp>
+      <p:grpSp>
+        <p:nvGrpSpPr>
+          <p:cNvPr id="13" name="Group 12"/>
+          <p:cNvGrpSpPr/>
+          <p:nvPr/>
+        </p:nvGrpSpPr>
+        <p:grpSpPr>
+          <a:xfrm>
+            <a:off x="7911087" y="2322410"/>
+            <a:ext cx="4382544" cy="1628992"/>
+            <a:chOff x="8179835" y="2249660"/>
+            <a:chExt cx="4382544" cy="1628992"/>
+          </a:xfrm>
+        </p:grpSpPr>
+        <p:sp>
+          <p:nvSpPr>
+            <p:cNvPr id="8" name="Oval 7"/>
+            <p:cNvSpPr/>
+            <p:nvPr/>
+          </p:nvSpPr>
+          <p:spPr>
+            <a:xfrm>
+              <a:off x="8179835" y="2886615"/>
+              <a:ext cx="992037" cy="992037"/>
+            </a:xfrm>
+            <a:prstGeom prst="ellipse">
+              <a:avLst/>
+            </a:prstGeom>
+            <a:solidFill>
+              <a:srgbClr val="0070C0"/>
+            </a:solidFill>
+            <a:ln>
+              <a:solidFill>
+                <a:schemeClr val="tx1"/>
+              </a:solidFill>
+            </a:ln>
+          </p:spPr>
+          <p:style>
+            <a:lnRef idx="2">
+              <a:schemeClr val="accent1">
+                <a:shade val="50000"/>
+              </a:schemeClr>
+            </a:lnRef>
+            <a:fillRef idx="1">
+              <a:schemeClr val="accent1"/>
+            </a:fillRef>
+            <a:effectRef idx="0">
+              <a:schemeClr val="accent1"/>
+            </a:effectRef>
+            <a:fontRef idx="minor">
+              <a:schemeClr val="lt1"/>
+            </a:fontRef>
+          </p:style>
+          <p:txBody>
+            <a:bodyPr rtlCol="0" anchor="ctr"/>
+            <a:lstStyle/>
+            <a:p>
+              <a:pPr algn="ctr"/>
+              <a:r>
+                <a:rPr lang="en-US" sz="1200" dirty="0" smtClean="0">
+                  <a:solidFill>
+                    <a:schemeClr val="tx1"/>
+                  </a:solidFill>
+                </a:rPr>
+                <a:t>D I-type</a:t>
+              </a:r>
+            </a:p>
+            <a:p>
+              <a:pPr algn="ctr"/>
+              <a:r>
+                <a:rPr lang="en-US" sz="1000" dirty="0" err="1" smtClean="0">
+                  <a:solidFill>
+                    <a:schemeClr val="bg1"/>
+                  </a:solidFill>
+                </a:rPr>
+                <a:t>Awrt</a:t>
+              </a:r>
+              <a:endParaRPr lang="en-US" sz="1000" dirty="0" smtClean="0">
+                <a:solidFill>
+                  <a:schemeClr val="bg1"/>
+                </a:solidFill>
+              </a:endParaRPr>
+            </a:p>
+            <a:p>
+              <a:pPr algn="ctr"/>
+              <a:r>
+                <a:rPr lang="en-US" sz="1000" dirty="0" smtClean="0">
+                  <a:solidFill>
+                    <a:schemeClr val="bg1"/>
+                  </a:solidFill>
+                </a:rPr>
+                <a:t>Bwrt</a:t>
+              </a:r>
+            </a:p>
+            <a:p>
+              <a:pPr algn="ctr"/>
+              <a:r>
+                <a:rPr lang="en-US" sz="1000" dirty="0" err="1" smtClean="0">
+                  <a:solidFill>
+                    <a:schemeClr val="bg1"/>
+                  </a:solidFill>
+                </a:rPr>
+                <a:t>ior</a:t>
+              </a:r>
+              <a:endParaRPr lang="en-US" sz="1000" dirty="0">
+                <a:solidFill>
+                  <a:schemeClr val="bg1"/>
+                </a:solidFill>
+              </a:endParaRPr>
+            </a:p>
+          </p:txBody>
+        </p:sp>
+        <p:sp>
+          <p:nvSpPr>
+            <p:cNvPr id="9" name="Oval 8"/>
+            <p:cNvSpPr/>
+            <p:nvPr/>
+          </p:nvSpPr>
+          <p:spPr>
+            <a:xfrm>
+              <a:off x="9509803" y="2634030"/>
+              <a:ext cx="992037" cy="992037"/>
+            </a:xfrm>
+            <a:prstGeom prst="ellipse">
+              <a:avLst/>
+            </a:prstGeom>
+            <a:solidFill>
+              <a:srgbClr val="0070C0"/>
+            </a:solidFill>
+            <a:ln>
+              <a:solidFill>
+                <a:schemeClr val="tx1"/>
+              </a:solidFill>
+            </a:ln>
+          </p:spPr>
+          <p:style>
+            <a:lnRef idx="2">
+              <a:schemeClr val="accent1">
+                <a:shade val="50000"/>
+              </a:schemeClr>
+            </a:lnRef>
+            <a:fillRef idx="1">
+              <a:schemeClr val="accent1"/>
+            </a:fillRef>
+            <a:effectRef idx="0">
+              <a:schemeClr val="accent1"/>
+            </a:effectRef>
+            <a:fontRef idx="minor">
+              <a:schemeClr val="lt1"/>
+            </a:fontRef>
+          </p:style>
+          <p:txBody>
+            <a:bodyPr rtlCol="0" anchor="ctr"/>
+            <a:lstStyle/>
+            <a:p>
+              <a:pPr algn="ctr"/>
+              <a:r>
+                <a:rPr lang="en-US" sz="1200" dirty="0" smtClean="0">
+                  <a:solidFill>
+                    <a:schemeClr val="tx1"/>
+                  </a:solidFill>
+                </a:rPr>
+                <a:t>E I-type</a:t>
+              </a:r>
+            </a:p>
+            <a:p>
+              <a:pPr algn="ctr"/>
+              <a:r>
+                <a:rPr lang="en-US" sz="1000" dirty="0" err="1" smtClean="0">
+                  <a:solidFill>
+                    <a:schemeClr val="bg1"/>
+                  </a:solidFill>
+                </a:rPr>
+                <a:t>ALUwrt</a:t>
+              </a:r>
+              <a:endParaRPr lang="en-US" sz="1000" dirty="0">
+                <a:solidFill>
+                  <a:schemeClr val="bg1"/>
+                </a:solidFill>
+              </a:endParaRPr>
+            </a:p>
+          </p:txBody>
+        </p:sp>
+        <p:sp>
+          <p:nvSpPr>
+            <p:cNvPr id="10" name="Oval 9"/>
+            <p:cNvSpPr/>
+            <p:nvPr/>
+          </p:nvSpPr>
+          <p:spPr>
+            <a:xfrm>
+              <a:off x="10714964" y="2518899"/>
+              <a:ext cx="1139673" cy="1139673"/>
+            </a:xfrm>
+            <a:prstGeom prst="ellipse">
+              <a:avLst/>
+            </a:prstGeom>
+            <a:solidFill>
+              <a:srgbClr val="0070C0"/>
+            </a:solidFill>
+            <a:ln>
+              <a:solidFill>
+                <a:schemeClr val="tx1"/>
+              </a:solidFill>
+            </a:ln>
+          </p:spPr>
+          <p:style>
+            <a:lnRef idx="2">
+              <a:schemeClr val="accent1">
+                <a:shade val="50000"/>
+              </a:schemeClr>
+            </a:lnRef>
+            <a:fillRef idx="1">
+              <a:schemeClr val="accent1"/>
+            </a:fillRef>
+            <a:effectRef idx="0">
+              <a:schemeClr val="accent1"/>
+            </a:effectRef>
+            <a:fontRef idx="minor">
+              <a:schemeClr val="lt1"/>
+            </a:fontRef>
+          </p:style>
+          <p:txBody>
+            <a:bodyPr rtlCol="0" anchor="ctr"/>
+            <a:lstStyle/>
+            <a:p>
+              <a:pPr algn="ctr"/>
+              <a:r>
+                <a:rPr lang="en-US" sz="1050" dirty="0" smtClean="0">
+                  <a:solidFill>
+                    <a:schemeClr val="tx1"/>
+                  </a:solidFill>
+                </a:rPr>
+                <a:t>MR I-type</a:t>
+              </a:r>
+            </a:p>
+            <a:p>
+              <a:pPr algn="ctr"/>
+              <a:r>
+                <a:rPr lang="en-US" sz="1000" dirty="0" err="1" smtClean="0">
+                  <a:solidFill>
+                    <a:schemeClr val="bg1"/>
+                  </a:solidFill>
+                </a:rPr>
+                <a:t>regWrt</a:t>
+              </a:r>
+              <a:endParaRPr lang="en-US" sz="1000" dirty="0" smtClean="0">
+                <a:solidFill>
+                  <a:schemeClr val="bg1"/>
+                </a:solidFill>
+              </a:endParaRPr>
+            </a:p>
+            <a:p>
+              <a:pPr algn="ctr"/>
+              <a:r>
+                <a:rPr lang="en-US" sz="1000" dirty="0" err="1" smtClean="0">
+                  <a:solidFill>
+                    <a:schemeClr val="bg1"/>
+                  </a:solidFill>
+                </a:rPr>
+                <a:t>wDate</a:t>
+              </a:r>
+              <a:r>
+                <a:rPr lang="en-US" sz="1000" dirty="0">
+                  <a:solidFill>
+                    <a:schemeClr val="bg1"/>
+                  </a:solidFill>
+                </a:rPr>
+                <a:t> </a:t>
+              </a:r>
+              <a:r>
+                <a:rPr lang="en-US" sz="1000" dirty="0" smtClean="0">
+                  <a:solidFill>
+                    <a:schemeClr val="bg1"/>
+                  </a:solidFill>
+                </a:rPr>
+                <a:t>= </a:t>
+              </a:r>
+              <a:r>
+                <a:rPr lang="en-US" sz="1000" dirty="0" smtClean="0">
+                  <a:solidFill>
+                    <a:schemeClr val="bg1"/>
+                  </a:solidFill>
+                </a:rPr>
+                <a:t>01</a:t>
+              </a:r>
+              <a:endParaRPr lang="en-US" sz="1000" dirty="0">
+                <a:solidFill>
+                  <a:schemeClr val="bg1"/>
+                </a:solidFill>
+              </a:endParaRPr>
+            </a:p>
+          </p:txBody>
+        </p:sp>
+        <p:cxnSp>
+          <p:nvCxnSpPr>
+            <p:cNvPr id="20" name="Straight Arrow Connector 19"/>
+            <p:cNvCxnSpPr>
+              <a:stCxn id="8" idx="6"/>
+              <a:endCxn id="9" idx="2"/>
+            </p:cNvCxnSpPr>
+            <p:nvPr/>
+          </p:nvCxnSpPr>
+          <p:spPr>
+            <a:xfrm flipV="1">
+              <a:off x="9171872" y="3130049"/>
+              <a:ext cx="337931" cy="252585"/>
+            </a:xfrm>
+            <a:prstGeom prst="straightConnector1">
+              <a:avLst/>
+            </a:prstGeom>
+            <a:ln>
+              <a:solidFill>
+                <a:schemeClr val="tx1"/>
+              </a:solidFill>
+              <a:tailEnd type="triangle"/>
+            </a:ln>
+          </p:spPr>
+          <p:style>
+            <a:lnRef idx="1">
+              <a:schemeClr val="accent1"/>
+            </a:lnRef>
+            <a:fillRef idx="0">
+              <a:schemeClr val="accent1"/>
+            </a:fillRef>
+            <a:effectRef idx="0">
+              <a:schemeClr val="accent1"/>
+            </a:effectRef>
+            <a:fontRef idx="minor">
+              <a:schemeClr val="tx1"/>
+            </a:fontRef>
+          </p:style>
+        </p:cxnSp>
+        <p:cxnSp>
+          <p:nvCxnSpPr>
+            <p:cNvPr id="23" name="Straight Arrow Connector 22"/>
+            <p:cNvCxnSpPr>
+              <a:stCxn id="9" idx="6"/>
+              <a:endCxn id="10" idx="2"/>
+            </p:cNvCxnSpPr>
+            <p:nvPr/>
+          </p:nvCxnSpPr>
+          <p:spPr>
+            <a:xfrm flipV="1">
+              <a:off x="10501840" y="3088736"/>
+              <a:ext cx="213124" cy="41313"/>
+            </a:xfrm>
+            <a:prstGeom prst="straightConnector1">
+              <a:avLst/>
+            </a:prstGeom>
+            <a:ln>
+              <a:solidFill>
+                <a:schemeClr val="tx1"/>
+              </a:solidFill>
+              <a:tailEnd type="triangle"/>
+            </a:ln>
+          </p:spPr>
+          <p:style>
+            <a:lnRef idx="1">
+              <a:schemeClr val="accent1"/>
+            </a:lnRef>
+            <a:fillRef idx="0">
+              <a:schemeClr val="accent1"/>
+            </a:fillRef>
+            <a:effectRef idx="0">
+              <a:schemeClr val="accent1"/>
+            </a:effectRef>
+            <a:fontRef idx="minor">
+              <a:schemeClr val="tx1"/>
+            </a:fontRef>
+          </p:style>
+        </p:cxnSp>
+        <p:sp>
+          <p:nvSpPr>
+            <p:cNvPr id="135" name="TextBox 134"/>
+            <p:cNvSpPr txBox="1"/>
+            <p:nvPr/>
+          </p:nvSpPr>
+          <p:spPr>
+            <a:xfrm>
+              <a:off x="11867381" y="2782121"/>
+              <a:ext cx="694998" cy="369332"/>
+            </a:xfrm>
+            <a:prstGeom prst="rect">
+              <a:avLst/>
+            </a:prstGeom>
+            <a:noFill/>
+            <a:ln>
+              <a:solidFill>
+                <a:schemeClr val="tx1"/>
+              </a:solidFill>
+            </a:ln>
+          </p:spPr>
+          <p:txBody>
+            <a:bodyPr wrap="none" rtlCol="0">
+              <a:spAutoFit/>
+            </a:bodyPr>
+            <a:lstStyle/>
+            <a:p>
+              <a:r>
+                <a:rPr lang="en-US" dirty="0" smtClean="0"/>
+                <a:t>Fetch</a:t>
+              </a:r>
+              <a:endParaRPr lang="en-US" dirty="0"/>
+            </a:p>
+          </p:txBody>
+        </p:sp>
+        <p:cxnSp>
+          <p:nvCxnSpPr>
+            <p:cNvPr id="161" name="Straight Arrow Connector 160"/>
+            <p:cNvCxnSpPr>
+              <a:stCxn id="10" idx="6"/>
+              <a:endCxn id="135" idx="1"/>
+            </p:cNvCxnSpPr>
+            <p:nvPr/>
+          </p:nvCxnSpPr>
+          <p:spPr>
+            <a:xfrm flipV="1">
+              <a:off x="11854637" y="2966787"/>
+              <a:ext cx="12744" cy="121949"/>
+            </a:xfrm>
+            <a:prstGeom prst="straightConnector1">
+              <a:avLst/>
+            </a:prstGeom>
+            <a:ln>
+              <a:solidFill>
+                <a:schemeClr val="tx1"/>
+              </a:solidFill>
+              <a:tailEnd type="triangle"/>
+            </a:ln>
+          </p:spPr>
+          <p:style>
+            <a:lnRef idx="1">
+              <a:schemeClr val="accent1"/>
+            </a:lnRef>
+            <a:fillRef idx="0">
+              <a:schemeClr val="accent1"/>
+            </a:fillRef>
+            <a:effectRef idx="0">
+              <a:schemeClr val="accent1"/>
+            </a:effectRef>
+            <a:fontRef idx="minor">
+              <a:schemeClr val="tx1"/>
+            </a:fontRef>
+          </p:style>
+        </p:cxnSp>
+        <p:sp>
+          <p:nvSpPr>
+            <p:cNvPr id="61" name="TextBox 60"/>
+            <p:cNvSpPr txBox="1"/>
+            <p:nvPr/>
+          </p:nvSpPr>
+          <p:spPr>
+            <a:xfrm>
+              <a:off x="8725968" y="2608873"/>
+              <a:ext cx="769763" cy="369332"/>
+            </a:xfrm>
+            <a:prstGeom prst="rect">
+              <a:avLst/>
+            </a:prstGeom>
+            <a:noFill/>
+            <a:ln>
+              <a:solidFill>
+                <a:schemeClr val="tx1"/>
+              </a:solidFill>
+            </a:ln>
+          </p:spPr>
+          <p:txBody>
+            <a:bodyPr wrap="none" rtlCol="0">
+              <a:spAutoFit/>
+            </a:bodyPr>
+            <a:lstStyle/>
+            <a:p>
+              <a:r>
+                <a:rPr lang="en-US" dirty="0" smtClean="0"/>
+                <a:t>00001</a:t>
+              </a:r>
+              <a:endParaRPr lang="en-US" dirty="0"/>
+            </a:p>
+          </p:txBody>
+        </p:sp>
+        <p:sp>
+          <p:nvSpPr>
+            <p:cNvPr id="62" name="TextBox 61"/>
+            <p:cNvSpPr txBox="1"/>
+            <p:nvPr/>
+          </p:nvSpPr>
+          <p:spPr>
+            <a:xfrm>
+              <a:off x="9873829" y="2264548"/>
+              <a:ext cx="769763" cy="369332"/>
+            </a:xfrm>
+            <a:prstGeom prst="rect">
+              <a:avLst/>
+            </a:prstGeom>
+            <a:noFill/>
+            <a:ln>
+              <a:solidFill>
+                <a:schemeClr val="tx1"/>
+              </a:solidFill>
+            </a:ln>
+          </p:spPr>
+          <p:txBody>
+            <a:bodyPr wrap="none" rtlCol="0">
+              <a:spAutoFit/>
+            </a:bodyPr>
+            <a:lstStyle/>
+            <a:p>
+              <a:r>
+                <a:rPr lang="en-US" dirty="0" smtClean="0"/>
+                <a:t>00010</a:t>
+              </a:r>
+              <a:endParaRPr lang="en-US" dirty="0"/>
+            </a:p>
+          </p:txBody>
+        </p:sp>
+        <p:sp>
+          <p:nvSpPr>
+            <p:cNvPr id="63" name="TextBox 62"/>
+            <p:cNvSpPr txBox="1"/>
+            <p:nvPr/>
+          </p:nvSpPr>
+          <p:spPr>
+            <a:xfrm>
+              <a:off x="11521999" y="2249660"/>
+              <a:ext cx="769763" cy="369332"/>
+            </a:xfrm>
+            <a:prstGeom prst="rect">
+              <a:avLst/>
+            </a:prstGeom>
+            <a:noFill/>
+            <a:ln>
+              <a:solidFill>
+                <a:schemeClr val="tx1"/>
+              </a:solidFill>
+            </a:ln>
+          </p:spPr>
+          <p:txBody>
+            <a:bodyPr wrap="none" rtlCol="0">
+              <a:spAutoFit/>
+            </a:bodyPr>
+            <a:lstStyle/>
+            <a:p>
+              <a:r>
+                <a:rPr lang="en-US" dirty="0" smtClean="0"/>
+                <a:t>00011</a:t>
+              </a:r>
+              <a:endParaRPr lang="en-US" dirty="0"/>
+            </a:p>
+          </p:txBody>
+        </p:sp>
+      </p:grpSp>
+      <p:sp>
+        <p:nvSpPr>
+          <p:cNvPr id="65" name="TextBox 64"/>
+          <p:cNvSpPr txBox="1"/>
+          <p:nvPr/>
+        </p:nvSpPr>
+        <p:spPr>
+          <a:xfrm>
+            <a:off x="5464518" y="3950382"/>
+            <a:ext cx="769763" cy="369332"/>
+          </a:xfrm>
+          <a:prstGeom prst="rect">
+            <a:avLst/>
+          </a:prstGeom>
+          <a:noFill/>
+          <a:ln>
+            <a:solidFill>
+              <a:schemeClr val="tx1"/>
+            </a:solidFill>
+          </a:ln>
+        </p:spPr>
+        <p:txBody>
+          <a:bodyPr wrap="none" rtlCol="0">
+            <a:spAutoFit/>
+          </a:bodyPr>
+          <a:lstStyle/>
+          <a:p>
+            <a:r>
+              <a:rPr lang="en-US" dirty="0" smtClean="0"/>
+              <a:t>00100</a:t>
+            </a:r>
+            <a:endParaRPr lang="en-US" dirty="0"/>
+          </a:p>
+        </p:txBody>
+      </p:sp>
+      <p:grpSp>
+        <p:nvGrpSpPr>
+          <p:cNvPr id="42" name="Group 41"/>
+          <p:cNvGrpSpPr/>
+          <p:nvPr/>
+        </p:nvGrpSpPr>
+        <p:grpSpPr>
+          <a:xfrm>
+            <a:off x="6717761" y="4099000"/>
+            <a:ext cx="3797768" cy="2151933"/>
+            <a:chOff x="5528741" y="4115759"/>
+            <a:chExt cx="3797768" cy="2151933"/>
+          </a:xfrm>
+        </p:grpSpPr>
+        <p:sp>
+          <p:nvSpPr>
+            <p:cNvPr id="30" name="Oval 29"/>
+            <p:cNvSpPr/>
+            <p:nvPr/>
+          </p:nvSpPr>
+          <p:spPr>
+            <a:xfrm>
+              <a:off x="5528741" y="4115759"/>
+              <a:ext cx="1112396" cy="1112396"/>
+            </a:xfrm>
+            <a:prstGeom prst="ellipse">
+              <a:avLst/>
+            </a:prstGeom>
+            <a:solidFill>
+              <a:srgbClr val="00B050"/>
+            </a:solidFill>
+            <a:ln>
+              <a:solidFill>
+                <a:schemeClr val="tx1"/>
+              </a:solidFill>
+            </a:ln>
+          </p:spPr>
+          <p:style>
+            <a:lnRef idx="2">
+              <a:schemeClr val="accent1">
+                <a:shade val="50000"/>
+              </a:schemeClr>
+            </a:lnRef>
+            <a:fillRef idx="1">
+              <a:schemeClr val="accent1"/>
+            </a:fillRef>
+            <a:effectRef idx="0">
+              <a:schemeClr val="accent1"/>
+            </a:effectRef>
+            <a:fontRef idx="minor">
+              <a:schemeClr val="lt1"/>
+            </a:fontRef>
+          </p:style>
+          <p:txBody>
+            <a:bodyPr rtlCol="0" anchor="ctr"/>
+            <a:lstStyle/>
+            <a:p>
+              <a:pPr algn="ctr"/>
+              <a:r>
+                <a:rPr lang="en-US" sz="1200" dirty="0" smtClean="0">
+                  <a:solidFill>
+                    <a:schemeClr val="tx1"/>
+                  </a:solidFill>
+                </a:rPr>
+                <a:t>Branch</a:t>
+              </a:r>
+            </a:p>
+            <a:p>
+              <a:pPr algn="ctr"/>
+              <a:r>
+                <a:rPr lang="en-US" sz="1000" dirty="0" err="1" smtClean="0">
+                  <a:solidFill>
+                    <a:schemeClr val="bg1"/>
+                  </a:solidFill>
+                </a:rPr>
+                <a:t>Awrt</a:t>
+              </a:r>
+              <a:endParaRPr lang="en-US" sz="1000" dirty="0" smtClean="0">
+                <a:solidFill>
+                  <a:schemeClr val="bg1"/>
+                </a:solidFill>
+              </a:endParaRPr>
+            </a:p>
+            <a:p>
+              <a:pPr algn="ctr"/>
+              <a:r>
+                <a:rPr lang="en-US" sz="1000" dirty="0" smtClean="0">
+                  <a:solidFill>
+                    <a:schemeClr val="bg1"/>
+                  </a:solidFill>
+                </a:rPr>
+                <a:t>Bwrt</a:t>
+              </a:r>
+            </a:p>
+            <a:p>
+              <a:pPr algn="ctr"/>
+              <a:r>
+                <a:rPr lang="en-US" sz="1000" dirty="0" err="1" smtClean="0"/>
+                <a:t>useFirstReg</a:t>
+              </a:r>
+              <a:endParaRPr lang="en-US" sz="1000" dirty="0">
+                <a:solidFill>
+                  <a:schemeClr val="bg1"/>
+                </a:solidFill>
+              </a:endParaRPr>
+            </a:p>
+          </p:txBody>
+        </p:sp>
+        <p:sp>
+          <p:nvSpPr>
+            <p:cNvPr id="31" name="Oval 30"/>
+            <p:cNvSpPr/>
+            <p:nvPr/>
+          </p:nvSpPr>
+          <p:spPr>
+            <a:xfrm>
+              <a:off x="6927740" y="5275655"/>
+              <a:ext cx="992037" cy="992037"/>
+            </a:xfrm>
+            <a:prstGeom prst="ellipse">
+              <a:avLst/>
+            </a:prstGeom>
+            <a:solidFill>
+              <a:srgbClr val="00B050"/>
+            </a:solidFill>
+            <a:ln>
+              <a:solidFill>
+                <a:schemeClr val="tx1"/>
+              </a:solidFill>
+            </a:ln>
+          </p:spPr>
+          <p:style>
+            <a:lnRef idx="2">
+              <a:schemeClr val="accent1">
+                <a:shade val="50000"/>
+              </a:schemeClr>
+            </a:lnRef>
+            <a:fillRef idx="1">
+              <a:schemeClr val="accent1"/>
+            </a:fillRef>
+            <a:effectRef idx="0">
+              <a:schemeClr val="accent1"/>
+            </a:effectRef>
+            <a:fontRef idx="minor">
+              <a:schemeClr val="lt1"/>
+            </a:fontRef>
+          </p:style>
+          <p:txBody>
+            <a:bodyPr rtlCol="0" anchor="ctr"/>
+            <a:lstStyle/>
+            <a:p>
+              <a:pPr algn="ctr"/>
+              <a:r>
+                <a:rPr lang="en-US" sz="1200" dirty="0" smtClean="0">
+                  <a:solidFill>
+                    <a:schemeClr val="tx1"/>
+                  </a:solidFill>
+                </a:rPr>
+                <a:t>Branch</a:t>
+              </a:r>
+            </a:p>
+            <a:p>
+              <a:pPr algn="ctr"/>
+              <a:r>
+                <a:rPr lang="en-US" sz="1000" dirty="0" smtClean="0">
+                  <a:solidFill>
+                    <a:schemeClr val="bg1"/>
+                  </a:solidFill>
+                </a:rPr>
+                <a:t>branch</a:t>
+              </a:r>
+              <a:endParaRPr lang="en-US" sz="1000" dirty="0">
+                <a:solidFill>
+                  <a:schemeClr val="bg1"/>
+                </a:solidFill>
+              </a:endParaRPr>
+            </a:p>
+          </p:txBody>
+        </p:sp>
+        <p:cxnSp>
+          <p:nvCxnSpPr>
+            <p:cNvPr id="83" name="Straight Arrow Connector 82"/>
+            <p:cNvCxnSpPr>
+              <a:stCxn id="30" idx="5"/>
+              <a:endCxn id="31" idx="1"/>
+            </p:cNvCxnSpPr>
+            <p:nvPr/>
+          </p:nvCxnSpPr>
+          <p:spPr>
+            <a:xfrm>
+              <a:off x="6478230" y="5065248"/>
+              <a:ext cx="594790" cy="355687"/>
+            </a:xfrm>
+            <a:prstGeom prst="straightConnector1">
+              <a:avLst/>
+            </a:prstGeom>
+            <a:ln>
+              <a:solidFill>
+                <a:schemeClr val="tx1"/>
+              </a:solidFill>
+              <a:tailEnd type="triangle"/>
+            </a:ln>
+          </p:spPr>
+          <p:style>
+            <a:lnRef idx="1">
+              <a:schemeClr val="accent1"/>
+            </a:lnRef>
+            <a:fillRef idx="0">
+              <a:schemeClr val="accent1"/>
+            </a:fillRef>
+            <a:effectRef idx="0">
+              <a:schemeClr val="accent1"/>
+            </a:effectRef>
+            <a:fontRef idx="minor">
+              <a:schemeClr val="tx1"/>
+            </a:fontRef>
+          </p:style>
+        </p:cxnSp>
+        <p:sp>
+          <p:nvSpPr>
+            <p:cNvPr id="141" name="TextBox 140"/>
+            <p:cNvSpPr txBox="1"/>
+            <p:nvPr/>
+          </p:nvSpPr>
+          <p:spPr>
+            <a:xfrm>
+              <a:off x="8631511" y="5587007"/>
+              <a:ext cx="694998" cy="369332"/>
+            </a:xfrm>
+            <a:prstGeom prst="rect">
+              <a:avLst/>
+            </a:prstGeom>
+            <a:noFill/>
+            <a:ln>
+              <a:solidFill>
+                <a:schemeClr val="tx1"/>
+              </a:solidFill>
+            </a:ln>
+          </p:spPr>
+          <p:txBody>
+            <a:bodyPr wrap="none" rtlCol="0">
+              <a:spAutoFit/>
+            </a:bodyPr>
+            <a:lstStyle/>
+            <a:p>
+              <a:r>
+                <a:rPr lang="en-US" dirty="0" smtClean="0"/>
+                <a:t>Fetch</a:t>
+              </a:r>
+              <a:endParaRPr lang="en-US" dirty="0"/>
+            </a:p>
+          </p:txBody>
+        </p:sp>
+        <p:cxnSp>
+          <p:nvCxnSpPr>
+            <p:cNvPr id="146" name="Straight Arrow Connector 145"/>
+            <p:cNvCxnSpPr>
+              <a:stCxn id="31" idx="6"/>
+              <a:endCxn id="141" idx="1"/>
+            </p:cNvCxnSpPr>
+            <p:nvPr/>
+          </p:nvCxnSpPr>
+          <p:spPr>
+            <a:xfrm flipV="1">
+              <a:off x="7919777" y="5771673"/>
+              <a:ext cx="711734" cy="1"/>
+            </a:xfrm>
+            <a:prstGeom prst="straightConnector1">
+              <a:avLst/>
+            </a:prstGeom>
+            <a:ln>
+              <a:solidFill>
+                <a:schemeClr val="tx1"/>
+              </a:solidFill>
+              <a:tailEnd type="triangle"/>
+            </a:ln>
+          </p:spPr>
+          <p:style>
+            <a:lnRef idx="1">
+              <a:schemeClr val="accent1"/>
+            </a:lnRef>
+            <a:fillRef idx="0">
+              <a:schemeClr val="accent1"/>
+            </a:fillRef>
+            <a:effectRef idx="0">
+              <a:schemeClr val="accent1"/>
+            </a:effectRef>
+            <a:fontRef idx="minor">
+              <a:schemeClr val="tx1"/>
+            </a:fontRef>
+          </p:style>
+        </p:cxnSp>
+        <p:sp>
+          <p:nvSpPr>
+            <p:cNvPr id="67" name="TextBox 66"/>
+            <p:cNvSpPr txBox="1"/>
+            <p:nvPr/>
+          </p:nvSpPr>
+          <p:spPr>
+            <a:xfrm>
+              <a:off x="6543025" y="4719916"/>
+              <a:ext cx="769763" cy="369332"/>
+            </a:xfrm>
+            <a:prstGeom prst="rect">
+              <a:avLst/>
+            </a:prstGeom>
+            <a:noFill/>
+            <a:ln>
+              <a:solidFill>
+                <a:schemeClr val="tx1"/>
+              </a:solidFill>
+            </a:ln>
+          </p:spPr>
+          <p:txBody>
+            <a:bodyPr wrap="none" rtlCol="0">
+              <a:spAutoFit/>
+            </a:bodyPr>
+            <a:lstStyle/>
+            <a:p>
+              <a:r>
+                <a:rPr lang="en-US" dirty="0" smtClean="0"/>
+                <a:t>00101</a:t>
+              </a:r>
+              <a:endParaRPr lang="en-US" dirty="0"/>
+            </a:p>
+          </p:txBody>
+        </p:sp>
+        <p:sp>
+          <p:nvSpPr>
+            <p:cNvPr id="69" name="TextBox 68"/>
+            <p:cNvSpPr txBox="1"/>
+            <p:nvPr/>
+          </p:nvSpPr>
+          <p:spPr>
+            <a:xfrm>
+              <a:off x="7742243" y="5229511"/>
+              <a:ext cx="769763" cy="369332"/>
+            </a:xfrm>
+            <a:prstGeom prst="rect">
+              <a:avLst/>
+            </a:prstGeom>
+            <a:noFill/>
+            <a:ln>
+              <a:solidFill>
+                <a:schemeClr val="tx1"/>
+              </a:solidFill>
+            </a:ln>
+          </p:spPr>
+          <p:txBody>
+            <a:bodyPr wrap="none" rtlCol="0">
+              <a:spAutoFit/>
+            </a:bodyPr>
+            <a:lstStyle/>
+            <a:p>
+              <a:r>
+                <a:rPr lang="en-US" dirty="0" smtClean="0"/>
+                <a:t>00110</a:t>
+              </a:r>
+              <a:endParaRPr lang="en-US" dirty="0"/>
+            </a:p>
+          </p:txBody>
+        </p:sp>
+      </p:grpSp>
+      <p:sp>
+        <p:nvSpPr>
+          <p:cNvPr id="70" name="TextBox 69"/>
+          <p:cNvSpPr txBox="1"/>
+          <p:nvPr/>
+        </p:nvSpPr>
+        <p:spPr>
+          <a:xfrm>
+            <a:off x="3081158" y="5034844"/>
+            <a:ext cx="769763" cy="369332"/>
+          </a:xfrm>
+          <a:prstGeom prst="rect">
+            <a:avLst/>
+          </a:prstGeom>
+          <a:noFill/>
+          <a:ln>
+            <a:solidFill>
+              <a:schemeClr val="tx1"/>
+            </a:solidFill>
+          </a:ln>
+        </p:spPr>
+        <p:txBody>
+          <a:bodyPr wrap="none" rtlCol="0">
+            <a:spAutoFit/>
+          </a:bodyPr>
+          <a:lstStyle/>
+          <a:p>
+            <a:r>
+              <a:rPr lang="en-US" dirty="0" smtClean="0"/>
+              <a:t>01000</a:t>
+            </a:r>
+            <a:endParaRPr lang="en-US" dirty="0"/>
+          </a:p>
+        </p:txBody>
+      </p:sp>
+      <p:sp>
+        <p:nvSpPr>
+          <p:cNvPr id="72" name="TextBox 71"/>
+          <p:cNvSpPr txBox="1"/>
+          <p:nvPr/>
+        </p:nvSpPr>
+        <p:spPr>
+          <a:xfrm>
+            <a:off x="1723907" y="5147582"/>
+            <a:ext cx="769763" cy="369332"/>
+          </a:xfrm>
+          <a:prstGeom prst="rect">
+            <a:avLst/>
+          </a:prstGeom>
+          <a:noFill/>
+          <a:ln>
+            <a:solidFill>
+              <a:schemeClr val="tx1"/>
+            </a:solidFill>
+          </a:ln>
+        </p:spPr>
+        <p:txBody>
+          <a:bodyPr wrap="none" rtlCol="0">
+            <a:spAutoFit/>
+          </a:bodyPr>
+          <a:lstStyle/>
+          <a:p>
+            <a:r>
+              <a:rPr lang="en-US" dirty="0" smtClean="0"/>
+              <a:t>01001</a:t>
+            </a:r>
+            <a:endParaRPr lang="en-US" dirty="0"/>
+          </a:p>
+        </p:txBody>
+      </p:sp>
+      <p:sp>
+        <p:nvSpPr>
+          <p:cNvPr id="73" name="TextBox 72"/>
+          <p:cNvSpPr txBox="1"/>
+          <p:nvPr/>
+        </p:nvSpPr>
+        <p:spPr>
+          <a:xfrm>
+            <a:off x="223883" y="5083429"/>
+            <a:ext cx="769763" cy="369332"/>
+          </a:xfrm>
+          <a:prstGeom prst="rect">
+            <a:avLst/>
+          </a:prstGeom>
+          <a:noFill/>
+          <a:ln>
+            <a:solidFill>
+              <a:schemeClr val="tx1"/>
+            </a:solidFill>
+          </a:ln>
+        </p:spPr>
+        <p:txBody>
+          <a:bodyPr wrap="none" rtlCol="0">
+            <a:spAutoFit/>
+          </a:bodyPr>
+          <a:lstStyle/>
+          <a:p>
+            <a:r>
+              <a:rPr lang="en-US" dirty="0" smtClean="0"/>
+              <a:t>01010</a:t>
+            </a:r>
+            <a:endParaRPr lang="en-US" dirty="0"/>
+          </a:p>
+        </p:txBody>
+      </p:sp>
+      <p:sp>
+        <p:nvSpPr>
+          <p:cNvPr id="74" name="TextBox 73"/>
+          <p:cNvSpPr txBox="1"/>
+          <p:nvPr/>
+        </p:nvSpPr>
+        <p:spPr>
+          <a:xfrm>
+            <a:off x="4403698" y="2519268"/>
+            <a:ext cx="769763" cy="369332"/>
+          </a:xfrm>
+          <a:prstGeom prst="rect">
+            <a:avLst/>
+          </a:prstGeom>
+          <a:noFill/>
+          <a:ln>
+            <a:solidFill>
+              <a:schemeClr val="tx1"/>
+            </a:solidFill>
+          </a:ln>
+        </p:spPr>
+        <p:txBody>
+          <a:bodyPr wrap="none" rtlCol="0">
+            <a:spAutoFit/>
+          </a:bodyPr>
+          <a:lstStyle/>
+          <a:p>
+            <a:r>
+              <a:rPr lang="en-US" dirty="0" smtClean="0"/>
+              <a:t>01011</a:t>
+            </a:r>
+            <a:endParaRPr lang="en-US" dirty="0"/>
+          </a:p>
+        </p:txBody>
+      </p:sp>
+      <p:sp>
+        <p:nvSpPr>
+          <p:cNvPr id="75" name="TextBox 74"/>
+          <p:cNvSpPr txBox="1"/>
+          <p:nvPr/>
+        </p:nvSpPr>
+        <p:spPr>
+          <a:xfrm>
+            <a:off x="3186321" y="2424765"/>
+            <a:ext cx="769763" cy="369332"/>
+          </a:xfrm>
+          <a:prstGeom prst="rect">
+            <a:avLst/>
+          </a:prstGeom>
+          <a:noFill/>
+          <a:ln>
+            <a:solidFill>
+              <a:schemeClr val="tx1"/>
+            </a:solidFill>
+          </a:ln>
+        </p:spPr>
+        <p:txBody>
+          <a:bodyPr wrap="none" rtlCol="0">
+            <a:spAutoFit/>
+          </a:bodyPr>
+          <a:lstStyle/>
+          <a:p>
+            <a:r>
+              <a:rPr lang="en-US" dirty="0" smtClean="0"/>
+              <a:t>01100</a:t>
+            </a:r>
+            <a:endParaRPr lang="en-US" dirty="0"/>
+          </a:p>
+        </p:txBody>
+      </p:sp>
+      <p:sp>
+        <p:nvSpPr>
+          <p:cNvPr id="76" name="TextBox 75"/>
+          <p:cNvSpPr txBox="1"/>
+          <p:nvPr/>
+        </p:nvSpPr>
+        <p:spPr>
+          <a:xfrm>
+            <a:off x="1978414" y="2213681"/>
+            <a:ext cx="769763" cy="369332"/>
+          </a:xfrm>
+          <a:prstGeom prst="rect">
+            <a:avLst/>
+          </a:prstGeom>
+          <a:noFill/>
+          <a:ln>
+            <a:solidFill>
+              <a:schemeClr val="tx1"/>
+            </a:solidFill>
+          </a:ln>
+        </p:spPr>
+        <p:txBody>
+          <a:bodyPr wrap="none" rtlCol="0">
+            <a:spAutoFit/>
+          </a:bodyPr>
+          <a:lstStyle/>
+          <a:p>
+            <a:r>
+              <a:rPr lang="en-US" dirty="0" smtClean="0"/>
+              <a:t>01101</a:t>
+            </a:r>
+            <a:endParaRPr lang="en-US" dirty="0"/>
+          </a:p>
+        </p:txBody>
+      </p:sp>
+      <p:sp>
+        <p:nvSpPr>
+          <p:cNvPr id="77" name="TextBox 76"/>
+          <p:cNvSpPr txBox="1"/>
+          <p:nvPr/>
+        </p:nvSpPr>
+        <p:spPr>
+          <a:xfrm>
+            <a:off x="4413859" y="806135"/>
+            <a:ext cx="769763" cy="369332"/>
+          </a:xfrm>
+          <a:prstGeom prst="rect">
+            <a:avLst/>
+          </a:prstGeom>
+          <a:noFill/>
+          <a:ln>
+            <a:solidFill>
+              <a:schemeClr val="tx1"/>
+            </a:solidFill>
+          </a:ln>
+        </p:spPr>
+        <p:txBody>
+          <a:bodyPr wrap="none" rtlCol="0">
+            <a:spAutoFit/>
+          </a:bodyPr>
+          <a:lstStyle/>
+          <a:p>
+            <a:r>
+              <a:rPr lang="en-US" dirty="0" smtClean="0"/>
+              <a:t>01110</a:t>
+            </a:r>
+            <a:endParaRPr lang="en-US" dirty="0"/>
+          </a:p>
+        </p:txBody>
+      </p:sp>
+      <p:sp>
+        <p:nvSpPr>
+          <p:cNvPr id="78" name="TextBox 77"/>
+          <p:cNvSpPr txBox="1"/>
+          <p:nvPr/>
+        </p:nvSpPr>
+        <p:spPr>
+          <a:xfrm>
+            <a:off x="6681117" y="1229488"/>
+            <a:ext cx="769763" cy="369332"/>
+          </a:xfrm>
+          <a:prstGeom prst="rect">
+            <a:avLst/>
+          </a:prstGeom>
+          <a:noFill/>
+          <a:ln>
+            <a:solidFill>
+              <a:schemeClr val="tx1"/>
+            </a:solidFill>
+          </a:ln>
+        </p:spPr>
+        <p:txBody>
+          <a:bodyPr wrap="none" rtlCol="0">
+            <a:spAutoFit/>
+          </a:bodyPr>
+          <a:lstStyle/>
+          <a:p>
+            <a:r>
+              <a:rPr lang="en-US" dirty="0" smtClean="0"/>
+              <a:t>01111</a:t>
+            </a:r>
+            <a:endParaRPr lang="en-US" dirty="0"/>
+          </a:p>
+        </p:txBody>
+      </p:sp>
+      <p:sp>
+        <p:nvSpPr>
+          <p:cNvPr id="79" name="TextBox 78"/>
+          <p:cNvSpPr txBox="1"/>
+          <p:nvPr/>
+        </p:nvSpPr>
+        <p:spPr>
+          <a:xfrm>
+            <a:off x="6876684" y="-107007"/>
+            <a:ext cx="769763" cy="369332"/>
+          </a:xfrm>
+          <a:prstGeom prst="rect">
+            <a:avLst/>
+          </a:prstGeom>
+          <a:noFill/>
+          <a:ln>
+            <a:solidFill>
+              <a:schemeClr val="tx1"/>
+            </a:solidFill>
+          </a:ln>
+        </p:spPr>
+        <p:txBody>
+          <a:bodyPr wrap="none" rtlCol="0">
+            <a:spAutoFit/>
+          </a:bodyPr>
+          <a:lstStyle/>
+          <a:p>
+            <a:r>
+              <a:rPr lang="en-US" dirty="0" smtClean="0"/>
+              <a:t>10000</a:t>
+            </a:r>
+            <a:endParaRPr lang="en-US" dirty="0"/>
+          </a:p>
+        </p:txBody>
+      </p:sp>
+      <p:sp>
+        <p:nvSpPr>
+          <p:cNvPr id="80" name="TextBox 79"/>
+          <p:cNvSpPr txBox="1"/>
+          <p:nvPr/>
+        </p:nvSpPr>
+        <p:spPr>
+          <a:xfrm>
+            <a:off x="8273193" y="2096936"/>
+            <a:ext cx="769763" cy="369332"/>
+          </a:xfrm>
+          <a:prstGeom prst="rect">
+            <a:avLst/>
+          </a:prstGeom>
+          <a:noFill/>
+          <a:ln>
+            <a:solidFill>
+              <a:schemeClr val="tx1"/>
+            </a:solidFill>
+          </a:ln>
+        </p:spPr>
+        <p:txBody>
+          <a:bodyPr wrap="none" rtlCol="0">
+            <a:spAutoFit/>
+          </a:bodyPr>
+          <a:lstStyle/>
+          <a:p>
+            <a:r>
+              <a:rPr lang="en-US" dirty="0" smtClean="0"/>
+              <a:t>10001</a:t>
+            </a:r>
+            <a:endParaRPr lang="en-US" dirty="0"/>
+          </a:p>
+        </p:txBody>
+      </p:sp>
+      <p:sp>
+        <p:nvSpPr>
+          <p:cNvPr id="82" name="TextBox 81"/>
+          <p:cNvSpPr txBox="1"/>
+          <p:nvPr/>
+        </p:nvSpPr>
+        <p:spPr>
+          <a:xfrm>
+            <a:off x="9137990" y="1188035"/>
+            <a:ext cx="769763" cy="369332"/>
+          </a:xfrm>
+          <a:prstGeom prst="rect">
+            <a:avLst/>
+          </a:prstGeom>
+          <a:noFill/>
+          <a:ln>
+            <a:solidFill>
+              <a:schemeClr val="tx1"/>
+            </a:solidFill>
+          </a:ln>
+        </p:spPr>
+        <p:txBody>
+          <a:bodyPr wrap="none" rtlCol="0">
+            <a:spAutoFit/>
+          </a:bodyPr>
+          <a:lstStyle/>
+          <a:p>
+            <a:r>
+              <a:rPr lang="en-US" dirty="0" smtClean="0"/>
+              <a:t>10010</a:t>
+            </a:r>
+            <a:endParaRPr lang="en-US" dirty="0"/>
+          </a:p>
+        </p:txBody>
+      </p:sp>
+      <p:sp>
+        <p:nvSpPr>
+          <p:cNvPr id="84" name="TextBox 83"/>
+          <p:cNvSpPr txBox="1"/>
+          <p:nvPr/>
+        </p:nvSpPr>
+        <p:spPr>
+          <a:xfrm>
+            <a:off x="9892722" y="730510"/>
+            <a:ext cx="769763" cy="369332"/>
+          </a:xfrm>
+          <a:prstGeom prst="rect">
+            <a:avLst/>
+          </a:prstGeom>
+          <a:noFill/>
+          <a:ln>
+            <a:solidFill>
+              <a:schemeClr val="tx1"/>
+            </a:solidFill>
+          </a:ln>
+        </p:spPr>
+        <p:txBody>
+          <a:bodyPr wrap="none" rtlCol="0">
+            <a:spAutoFit/>
+          </a:bodyPr>
+          <a:lstStyle/>
+          <a:p>
+            <a:r>
+              <a:rPr lang="en-US" dirty="0" smtClean="0"/>
+              <a:t>10011</a:t>
+            </a:r>
+            <a:endParaRPr lang="en-US" dirty="0"/>
+          </a:p>
+        </p:txBody>
+      </p:sp>
+      <p:grpSp>
+        <p:nvGrpSpPr>
+          <p:cNvPr id="150" name="Group 149"/>
+          <p:cNvGrpSpPr/>
+          <p:nvPr/>
+        </p:nvGrpSpPr>
+        <p:grpSpPr>
+          <a:xfrm>
+            <a:off x="2179380" y="34119"/>
+            <a:ext cx="1599417" cy="914400"/>
+            <a:chOff x="10453542" y="5487357"/>
+            <a:chExt cx="1599417" cy="914400"/>
+          </a:xfrm>
+        </p:grpSpPr>
+        <p:cxnSp>
+          <p:nvCxnSpPr>
+            <p:cNvPr id="134" name="Elbow Connector 133"/>
+            <p:cNvCxnSpPr>
+              <a:stCxn id="132" idx="6"/>
+              <a:endCxn id="132" idx="2"/>
+            </p:cNvCxnSpPr>
+            <p:nvPr/>
+          </p:nvCxnSpPr>
+          <p:spPr>
+            <a:xfrm flipH="1">
+              <a:off x="10453542" y="5944557"/>
+              <a:ext cx="914400" cy="12700"/>
+            </a:xfrm>
+            <a:prstGeom prst="bentConnector5">
+              <a:avLst>
+                <a:gd name="adj1" fmla="val -25000"/>
+                <a:gd name="adj2" fmla="val 5400000"/>
+                <a:gd name="adj3" fmla="val 125000"/>
+              </a:avLst>
+            </a:prstGeom>
+            <a:ln>
+              <a:solidFill>
+                <a:schemeClr val="tx1"/>
+              </a:solidFill>
+              <a:tailEnd type="triangle"/>
+            </a:ln>
+          </p:spPr>
+          <p:style>
+            <a:lnRef idx="1">
+              <a:schemeClr val="accent1"/>
+            </a:lnRef>
+            <a:fillRef idx="0">
+              <a:schemeClr val="accent1"/>
+            </a:fillRef>
+            <a:effectRef idx="0">
+              <a:schemeClr val="accent1"/>
+            </a:effectRef>
+            <a:fontRef idx="minor">
+              <a:schemeClr val="tx1"/>
+            </a:fontRef>
+          </p:style>
+        </p:cxnSp>
+        <p:sp>
+          <p:nvSpPr>
+            <p:cNvPr id="132" name="Oval 131"/>
+            <p:cNvSpPr/>
+            <p:nvPr/>
+          </p:nvSpPr>
+          <p:spPr>
+            <a:xfrm>
+              <a:off x="10453542" y="5487357"/>
+              <a:ext cx="914400" cy="914400"/>
+            </a:xfrm>
+            <a:prstGeom prst="ellipse">
+              <a:avLst/>
+            </a:prstGeom>
+            <a:ln>
+              <a:solidFill>
+                <a:schemeClr val="tx1"/>
+              </a:solidFill>
+            </a:ln>
+          </p:spPr>
+          <p:style>
+            <a:lnRef idx="2">
+              <a:schemeClr val="accent1">
+                <a:shade val="50000"/>
+              </a:schemeClr>
+            </a:lnRef>
+            <a:fillRef idx="1">
+              <a:schemeClr val="accent1"/>
+            </a:fillRef>
+            <a:effectRef idx="0">
+              <a:schemeClr val="accent1"/>
+            </a:effectRef>
+            <a:fontRef idx="minor">
+              <a:schemeClr val="lt1"/>
+            </a:fontRef>
+          </p:style>
+          <p:txBody>
+            <a:bodyPr rtlCol="0" anchor="ctr"/>
+            <a:lstStyle/>
+            <a:p>
+              <a:pPr algn="ctr"/>
+              <a:r>
+                <a:rPr lang="en-US" sz="1000" dirty="0" smtClean="0"/>
+                <a:t>Micah’s Magic Bit </a:t>
+              </a:r>
+              <a:r>
+                <a:rPr lang="en-US" sz="1000" dirty="0" err="1" smtClean="0"/>
+                <a:t>Factoryu</a:t>
+              </a:r>
+              <a:endParaRPr lang="en-US" sz="1000" dirty="0"/>
+            </a:p>
+          </p:txBody>
+        </p:sp>
+        <p:sp>
+          <p:nvSpPr>
+            <p:cNvPr id="85" name="TextBox 84"/>
+            <p:cNvSpPr txBox="1"/>
+            <p:nvPr/>
+          </p:nvSpPr>
+          <p:spPr>
+            <a:xfrm>
+              <a:off x="11283196" y="5566996"/>
+              <a:ext cx="769763" cy="369332"/>
+            </a:xfrm>
+            <a:prstGeom prst="rect">
+              <a:avLst/>
+            </a:prstGeom>
+            <a:noFill/>
+            <a:ln>
+              <a:solidFill>
+                <a:schemeClr val="tx1"/>
+              </a:solidFill>
+            </a:ln>
+          </p:spPr>
+          <p:txBody>
+            <a:bodyPr wrap="none" rtlCol="0">
+              <a:spAutoFit/>
+            </a:bodyPr>
+            <a:lstStyle/>
+            <a:p>
+              <a:r>
+                <a:rPr lang="en-US" dirty="0" smtClean="0"/>
+                <a:t>99999</a:t>
+              </a:r>
+              <a:endParaRPr lang="en-US" dirty="0"/>
+            </a:p>
+          </p:txBody>
+        </p:sp>
+      </p:grpSp>
+      <p:sp>
+        <p:nvSpPr>
+          <p:cNvPr id="94" name="Oval 93"/>
+          <p:cNvSpPr/>
+          <p:nvPr/>
+        </p:nvSpPr>
+        <p:spPr>
+          <a:xfrm>
+            <a:off x="132656" y="439226"/>
+            <a:ext cx="1668062" cy="1683544"/>
+          </a:xfrm>
+          <a:prstGeom prst="ellipse">
+            <a:avLst/>
+          </a:prstGeom>
+          <a:solidFill>
+            <a:schemeClr val="accent5">
+              <a:lumMod val="50000"/>
+            </a:schemeClr>
+          </a:solidFill>
+          <a:ln>
+            <a:solidFill>
+              <a:schemeClr val="tx1"/>
+            </a:solidFill>
+          </a:ln>
+        </p:spPr>
+        <p:style>
+          <a:lnRef idx="2">
+            <a:schemeClr val="accent1">
+              <a:shade val="50000"/>
+            </a:schemeClr>
+          </a:lnRef>
+          <a:fillRef idx="1">
+            <a:schemeClr val="accent1"/>
+          </a:fillRef>
+          <a:effectRef idx="0">
+            <a:schemeClr val="accent1"/>
+          </a:effectRef>
+          <a:fontRef idx="minor">
+            <a:schemeClr val="lt1"/>
+          </a:fontRef>
+        </p:style>
+        <p:txBody>
+          <a:bodyPr rtlCol="0" anchor="ctr"/>
+          <a:lstStyle/>
+          <a:p>
+            <a:pPr algn="ctr"/>
+            <a:r>
+              <a:rPr lang="en-US" sz="1200" b="1" dirty="0" smtClean="0">
+                <a:solidFill>
+                  <a:schemeClr val="tx1"/>
+                </a:solidFill>
+              </a:rPr>
+              <a:t>[step]</a:t>
+            </a:r>
+            <a:endParaRPr lang="en-US" sz="1200" b="1" dirty="0" smtClean="0">
+              <a:solidFill>
+                <a:schemeClr val="tx1"/>
+              </a:solidFill>
+            </a:endParaRPr>
+          </a:p>
+          <a:p>
+            <a:pPr algn="ctr"/>
+            <a:r>
+              <a:rPr lang="en-US" sz="1200" b="1" dirty="0" smtClean="0">
+                <a:solidFill>
+                  <a:schemeClr val="tx1"/>
+                </a:solidFill>
+              </a:rPr>
+              <a:t>[instruction]</a:t>
+            </a:r>
+            <a:endParaRPr lang="en-US" sz="1200" dirty="0" smtClean="0">
+              <a:solidFill>
+                <a:schemeClr val="tx1"/>
+              </a:solidFill>
+            </a:endParaRPr>
+          </a:p>
+          <a:p>
+            <a:pPr algn="ctr"/>
+            <a:r>
+              <a:rPr lang="en-US" sz="1000" dirty="0" smtClean="0">
+                <a:solidFill>
+                  <a:schemeClr val="bg1"/>
+                </a:solidFill>
+              </a:rPr>
+              <a:t>High Control signal</a:t>
+            </a:r>
+            <a:endParaRPr lang="en-US" sz="1000" dirty="0" smtClean="0">
+              <a:solidFill>
+                <a:schemeClr val="bg1"/>
+              </a:solidFill>
+            </a:endParaRPr>
+          </a:p>
+          <a:p>
+            <a:pPr algn="ctr"/>
+            <a:r>
+              <a:rPr lang="en-US" sz="1000" dirty="0" smtClean="0">
+                <a:solidFill>
+                  <a:schemeClr val="bg1"/>
+                </a:solidFill>
+              </a:rPr>
+              <a:t>Control signal = 00</a:t>
+            </a:r>
+            <a:endParaRPr lang="en-US" sz="1000" dirty="0">
+              <a:solidFill>
+                <a:schemeClr val="bg1"/>
+              </a:solidFill>
+            </a:endParaRPr>
+          </a:p>
+        </p:txBody>
+      </p:sp>
       <p:cxnSp>
         <p:nvCxnSpPr>
-          <p:cNvPr id="161" name="Straight Arrow Connector 160"/>
+          <p:cNvPr id="29" name="Straight Arrow Connector 28"/>
           <p:cNvCxnSpPr>
-            <a:stCxn id="10" idx="6"/>
-            <a:endCxn id="135" idx="1"/>
+            <a:stCxn id="4" idx="5"/>
+            <a:endCxn id="86" idx="2"/>
           </p:cNvCxnSpPr>
           <p:nvPr/>
         </p:nvCxnSpPr>
         <p:spPr>
           <a:xfrm>
-            <a:off x="11237608" y="3939666"/>
-            <a:ext cx="249855" cy="0"/>
+            <a:off x="6971511" y="3676221"/>
+            <a:ext cx="1523405" cy="1032912"/>
           </a:xfrm>
           <a:prstGeom prst="straightConnector1">
             <a:avLst/>
@@ -6352,6 +7234,910 @@
           </a:fontRef>
         </p:style>
       </p:cxnSp>
+      <p:sp>
+        <p:nvSpPr>
+          <p:cNvPr id="90" name="TextBox 89"/>
+          <p:cNvSpPr txBox="1"/>
+          <p:nvPr/>
+        </p:nvSpPr>
+        <p:spPr>
+          <a:xfrm>
+            <a:off x="467109" y="69894"/>
+            <a:ext cx="976934" cy="369332"/>
+          </a:xfrm>
+          <a:prstGeom prst="rect">
+            <a:avLst/>
+          </a:prstGeom>
+          <a:noFill/>
+        </p:spPr>
+        <p:txBody>
+          <a:bodyPr wrap="none" rtlCol="0">
+            <a:spAutoFit/>
+          </a:bodyPr>
+          <a:lstStyle/>
+          <a:p>
+            <a:r>
+              <a:rPr lang="en-US" dirty="0" smtClean="0"/>
+              <a:t>example</a:t>
+            </a:r>
+            <a:endParaRPr lang="en-US" dirty="0"/>
+          </a:p>
+        </p:txBody>
+      </p:sp>
+      <p:grpSp>
+        <p:nvGrpSpPr>
+          <p:cNvPr id="105" name="Group 104"/>
+          <p:cNvGrpSpPr/>
+          <p:nvPr/>
+        </p:nvGrpSpPr>
+        <p:grpSpPr>
+          <a:xfrm>
+            <a:off x="8494916" y="3959812"/>
+            <a:ext cx="3667949" cy="1283722"/>
+            <a:chOff x="8367511" y="3900758"/>
+            <a:chExt cx="3667949" cy="1283722"/>
+          </a:xfrm>
+        </p:grpSpPr>
+        <p:sp>
+          <p:nvSpPr>
+            <p:cNvPr id="86" name="Oval 85"/>
+            <p:cNvSpPr/>
+            <p:nvPr/>
+          </p:nvSpPr>
+          <p:spPr>
+            <a:xfrm>
+              <a:off x="8367511" y="4214855"/>
+              <a:ext cx="870448" cy="870448"/>
+            </a:xfrm>
+            <a:prstGeom prst="ellipse">
+              <a:avLst/>
+            </a:prstGeom>
+            <a:solidFill>
+              <a:schemeClr val="accent5">
+                <a:lumMod val="50000"/>
+              </a:schemeClr>
+            </a:solidFill>
+            <a:ln>
+              <a:solidFill>
+                <a:schemeClr val="tx1"/>
+              </a:solidFill>
+            </a:ln>
+          </p:spPr>
+          <p:style>
+            <a:lnRef idx="2">
+              <a:schemeClr val="accent1">
+                <a:shade val="50000"/>
+              </a:schemeClr>
+            </a:lnRef>
+            <a:fillRef idx="1">
+              <a:schemeClr val="accent1"/>
+            </a:fillRef>
+            <a:effectRef idx="0">
+              <a:schemeClr val="accent1"/>
+            </a:effectRef>
+            <a:fontRef idx="minor">
+              <a:schemeClr val="lt1"/>
+            </a:fontRef>
+          </p:style>
+          <p:txBody>
+            <a:bodyPr rtlCol="0" anchor="ctr"/>
+            <a:lstStyle/>
+            <a:p>
+              <a:pPr algn="ctr"/>
+              <a:r>
+                <a:rPr lang="en-US" sz="1200" b="1" dirty="0" smtClean="0">
+                  <a:solidFill>
+                    <a:schemeClr val="tx1"/>
+                  </a:solidFill>
+                </a:rPr>
+                <a:t>D</a:t>
+              </a:r>
+            </a:p>
+            <a:p>
+              <a:pPr algn="ctr"/>
+              <a:r>
+                <a:rPr lang="en-US" sz="1000" b="1" dirty="0" smtClean="0">
+                  <a:solidFill>
+                    <a:schemeClr val="tx1"/>
+                  </a:solidFill>
+                </a:rPr>
+                <a:t>Set Less Than</a:t>
+              </a:r>
+            </a:p>
+            <a:p>
+              <a:pPr algn="ctr"/>
+              <a:r>
+                <a:rPr lang="en-US" sz="1000" dirty="0">
+                  <a:solidFill>
+                    <a:schemeClr val="tx1"/>
+                  </a:solidFill>
+                </a:rPr>
+                <a:t> </a:t>
+              </a:r>
+              <a:r>
+                <a:rPr lang="en-US" sz="1000" dirty="0" err="1">
+                  <a:solidFill>
+                    <a:schemeClr val="bg1"/>
+                  </a:solidFill>
+                </a:rPr>
+                <a:t>Awrt</a:t>
+              </a:r>
+              <a:endParaRPr lang="en-US" sz="1000" dirty="0">
+                <a:solidFill>
+                  <a:schemeClr val="bg1"/>
+                </a:solidFill>
+              </a:endParaRPr>
+            </a:p>
+            <a:p>
+              <a:pPr algn="ctr"/>
+              <a:r>
+                <a:rPr lang="en-US" sz="1000" dirty="0" err="1" smtClean="0">
+                  <a:solidFill>
+                    <a:schemeClr val="bg1"/>
+                  </a:solidFill>
+                </a:rPr>
+                <a:t>Bwrt</a:t>
+              </a:r>
+              <a:endParaRPr lang="en-US" sz="1000" dirty="0">
+                <a:solidFill>
+                  <a:schemeClr val="bg1"/>
+                </a:solidFill>
+              </a:endParaRPr>
+            </a:p>
+          </p:txBody>
+        </p:sp>
+        <p:sp>
+          <p:nvSpPr>
+            <p:cNvPr id="87" name="Oval 86"/>
+            <p:cNvSpPr/>
+            <p:nvPr/>
+          </p:nvSpPr>
+          <p:spPr>
+            <a:xfrm>
+              <a:off x="9366893" y="4214855"/>
+              <a:ext cx="870448" cy="870448"/>
+            </a:xfrm>
+            <a:prstGeom prst="ellipse">
+              <a:avLst/>
+            </a:prstGeom>
+            <a:solidFill>
+              <a:schemeClr val="accent5">
+                <a:lumMod val="50000"/>
+              </a:schemeClr>
+            </a:solidFill>
+            <a:ln>
+              <a:solidFill>
+                <a:schemeClr val="tx1"/>
+              </a:solidFill>
+            </a:ln>
+          </p:spPr>
+          <p:style>
+            <a:lnRef idx="2">
+              <a:schemeClr val="accent1">
+                <a:shade val="50000"/>
+              </a:schemeClr>
+            </a:lnRef>
+            <a:fillRef idx="1">
+              <a:schemeClr val="accent1"/>
+            </a:fillRef>
+            <a:effectRef idx="0">
+              <a:schemeClr val="accent1"/>
+            </a:effectRef>
+            <a:fontRef idx="minor">
+              <a:schemeClr val="lt1"/>
+            </a:fontRef>
+          </p:style>
+          <p:txBody>
+            <a:bodyPr rtlCol="0" anchor="ctr"/>
+            <a:lstStyle/>
+            <a:p>
+              <a:pPr algn="ctr"/>
+              <a:r>
+                <a:rPr lang="en-US" sz="1200" b="1" dirty="0" smtClean="0">
+                  <a:solidFill>
+                    <a:schemeClr val="tx1"/>
+                  </a:solidFill>
+                </a:rPr>
+                <a:t>E</a:t>
+              </a:r>
+              <a:endParaRPr lang="en-US" sz="1200" b="1" dirty="0" smtClean="0">
+                <a:solidFill>
+                  <a:schemeClr val="tx1"/>
+                </a:solidFill>
+              </a:endParaRPr>
+            </a:p>
+            <a:p>
+              <a:pPr algn="ctr"/>
+              <a:r>
+                <a:rPr lang="en-US" sz="1000" b="1" dirty="0" smtClean="0">
+                  <a:solidFill>
+                    <a:schemeClr val="tx1"/>
+                  </a:solidFill>
+                </a:rPr>
+                <a:t>Set Less Than</a:t>
+              </a:r>
+            </a:p>
+            <a:p>
+              <a:pPr algn="ctr"/>
+              <a:r>
+                <a:rPr lang="en-US" sz="1000" dirty="0" err="1" smtClean="0">
+                  <a:solidFill>
+                    <a:schemeClr val="bg1"/>
+                  </a:solidFill>
+                </a:rPr>
+                <a:t>ALUwrt</a:t>
+              </a:r>
+              <a:endParaRPr lang="en-US" sz="1000" dirty="0">
+                <a:solidFill>
+                  <a:schemeClr val="bg1"/>
+                </a:solidFill>
+              </a:endParaRPr>
+            </a:p>
+          </p:txBody>
+        </p:sp>
+        <p:sp>
+          <p:nvSpPr>
+            <p:cNvPr id="88" name="Oval 87"/>
+            <p:cNvSpPr/>
+            <p:nvPr/>
+          </p:nvSpPr>
+          <p:spPr>
+            <a:xfrm>
+              <a:off x="10465709" y="4090922"/>
+              <a:ext cx="1093558" cy="1093558"/>
+            </a:xfrm>
+            <a:prstGeom prst="ellipse">
+              <a:avLst/>
+            </a:prstGeom>
+            <a:solidFill>
+              <a:schemeClr val="accent5">
+                <a:lumMod val="50000"/>
+              </a:schemeClr>
+            </a:solidFill>
+            <a:ln>
+              <a:solidFill>
+                <a:schemeClr val="tx1"/>
+              </a:solidFill>
+            </a:ln>
+          </p:spPr>
+          <p:style>
+            <a:lnRef idx="2">
+              <a:schemeClr val="accent1">
+                <a:shade val="50000"/>
+              </a:schemeClr>
+            </a:lnRef>
+            <a:fillRef idx="1">
+              <a:schemeClr val="accent1"/>
+            </a:fillRef>
+            <a:effectRef idx="0">
+              <a:schemeClr val="accent1"/>
+            </a:effectRef>
+            <a:fontRef idx="minor">
+              <a:schemeClr val="lt1"/>
+            </a:fontRef>
+          </p:style>
+          <p:txBody>
+            <a:bodyPr rtlCol="0" anchor="ctr"/>
+            <a:lstStyle/>
+            <a:p>
+              <a:pPr algn="ctr"/>
+              <a:r>
+                <a:rPr lang="en-US" sz="1200" b="1" dirty="0" smtClean="0">
+                  <a:solidFill>
+                    <a:schemeClr val="tx1"/>
+                  </a:solidFill>
+                </a:rPr>
+                <a:t>MR</a:t>
+              </a:r>
+              <a:endParaRPr lang="en-US" sz="1200" b="1" dirty="0" smtClean="0">
+                <a:solidFill>
+                  <a:schemeClr val="tx1"/>
+                </a:solidFill>
+              </a:endParaRPr>
+            </a:p>
+            <a:p>
+              <a:pPr algn="ctr"/>
+              <a:r>
+                <a:rPr lang="en-US" sz="1000" b="1" dirty="0" smtClean="0">
+                  <a:solidFill>
+                    <a:schemeClr val="tx1"/>
+                  </a:solidFill>
+                </a:rPr>
+                <a:t>Set Less Than</a:t>
+              </a:r>
+            </a:p>
+            <a:p>
+              <a:pPr algn="ctr"/>
+              <a:r>
+                <a:rPr lang="en-US" sz="1000" dirty="0" err="1" smtClean="0">
+                  <a:solidFill>
+                    <a:schemeClr val="bg1"/>
+                  </a:solidFill>
+                </a:rPr>
+                <a:t>regWrite</a:t>
+              </a:r>
+              <a:endParaRPr lang="en-US" sz="1000" dirty="0" smtClean="0">
+                <a:solidFill>
+                  <a:schemeClr val="bg1"/>
+                </a:solidFill>
+              </a:endParaRPr>
+            </a:p>
+            <a:p>
+              <a:pPr algn="ctr"/>
+              <a:r>
+                <a:rPr lang="en-US" sz="1000" dirty="0" err="1" smtClean="0">
+                  <a:solidFill>
+                    <a:schemeClr val="bg1"/>
+                  </a:solidFill>
+                </a:rPr>
+                <a:t>wDat</a:t>
+              </a:r>
+              <a:r>
+                <a:rPr lang="en-US" sz="1000" dirty="0" smtClean="0">
+                  <a:solidFill>
+                    <a:schemeClr val="bg1"/>
+                  </a:solidFill>
+                </a:rPr>
+                <a:t> = 00</a:t>
+              </a:r>
+              <a:endParaRPr lang="en-US" sz="1000" dirty="0">
+                <a:solidFill>
+                  <a:schemeClr val="bg1"/>
+                </a:solidFill>
+              </a:endParaRPr>
+            </a:p>
+          </p:txBody>
+        </p:sp>
+        <p:cxnSp>
+          <p:nvCxnSpPr>
+            <p:cNvPr id="38" name="Straight Arrow Connector 37"/>
+            <p:cNvCxnSpPr>
+              <a:stCxn id="86" idx="6"/>
+              <a:endCxn id="87" idx="2"/>
+            </p:cNvCxnSpPr>
+            <p:nvPr/>
+          </p:nvCxnSpPr>
+          <p:spPr>
+            <a:xfrm>
+              <a:off x="9237959" y="4650079"/>
+              <a:ext cx="128934" cy="0"/>
+            </a:xfrm>
+            <a:prstGeom prst="straightConnector1">
+              <a:avLst/>
+            </a:prstGeom>
+            <a:ln>
+              <a:solidFill>
+                <a:schemeClr val="tx1"/>
+              </a:solidFill>
+              <a:tailEnd type="triangle"/>
+            </a:ln>
+          </p:spPr>
+          <p:style>
+            <a:lnRef idx="1">
+              <a:schemeClr val="accent1"/>
+            </a:lnRef>
+            <a:fillRef idx="0">
+              <a:schemeClr val="accent1"/>
+            </a:fillRef>
+            <a:effectRef idx="0">
+              <a:schemeClr val="accent1"/>
+            </a:effectRef>
+            <a:fontRef idx="minor">
+              <a:schemeClr val="tx1"/>
+            </a:fontRef>
+          </p:style>
+        </p:cxnSp>
+        <p:cxnSp>
+          <p:nvCxnSpPr>
+            <p:cNvPr id="40" name="Straight Arrow Connector 39"/>
+            <p:cNvCxnSpPr>
+              <a:stCxn id="87" idx="6"/>
+              <a:endCxn id="88" idx="2"/>
+            </p:cNvCxnSpPr>
+            <p:nvPr/>
+          </p:nvCxnSpPr>
+          <p:spPr>
+            <a:xfrm flipV="1">
+              <a:off x="10237341" y="4637701"/>
+              <a:ext cx="228368" cy="12378"/>
+            </a:xfrm>
+            <a:prstGeom prst="straightConnector1">
+              <a:avLst/>
+            </a:prstGeom>
+            <a:ln>
+              <a:solidFill>
+                <a:schemeClr val="tx1"/>
+              </a:solidFill>
+              <a:tailEnd type="triangle"/>
+            </a:ln>
+          </p:spPr>
+          <p:style>
+            <a:lnRef idx="1">
+              <a:schemeClr val="accent1"/>
+            </a:lnRef>
+            <a:fillRef idx="0">
+              <a:schemeClr val="accent1"/>
+            </a:fillRef>
+            <a:effectRef idx="0">
+              <a:schemeClr val="accent1"/>
+            </a:effectRef>
+            <a:fontRef idx="minor">
+              <a:schemeClr val="tx1"/>
+            </a:fontRef>
+          </p:style>
+        </p:cxnSp>
+        <p:sp>
+          <p:nvSpPr>
+            <p:cNvPr id="119" name="TextBox 118"/>
+            <p:cNvSpPr txBox="1"/>
+            <p:nvPr/>
+          </p:nvSpPr>
+          <p:spPr>
+            <a:xfrm>
+              <a:off x="8484251" y="3902025"/>
+              <a:ext cx="769763" cy="369332"/>
+            </a:xfrm>
+            <a:prstGeom prst="rect">
+              <a:avLst/>
+            </a:prstGeom>
+            <a:noFill/>
+            <a:ln>
+              <a:solidFill>
+                <a:schemeClr val="tx1"/>
+              </a:solidFill>
+            </a:ln>
+          </p:spPr>
+          <p:txBody>
+            <a:bodyPr wrap="none" rtlCol="0">
+              <a:spAutoFit/>
+            </a:bodyPr>
+            <a:lstStyle/>
+            <a:p>
+              <a:r>
+                <a:rPr lang="en-US" dirty="0" smtClean="0"/>
+                <a:t>10110</a:t>
+              </a:r>
+              <a:endParaRPr lang="en-US" dirty="0"/>
+            </a:p>
+          </p:txBody>
+        </p:sp>
+        <p:sp>
+          <p:nvSpPr>
+            <p:cNvPr id="120" name="TextBox 119"/>
+            <p:cNvSpPr txBox="1"/>
+            <p:nvPr/>
+          </p:nvSpPr>
+          <p:spPr>
+            <a:xfrm>
+              <a:off x="9549736" y="3900758"/>
+              <a:ext cx="769763" cy="369332"/>
+            </a:xfrm>
+            <a:prstGeom prst="rect">
+              <a:avLst/>
+            </a:prstGeom>
+            <a:noFill/>
+            <a:ln>
+              <a:solidFill>
+                <a:schemeClr val="tx1"/>
+              </a:solidFill>
+            </a:ln>
+          </p:spPr>
+          <p:txBody>
+            <a:bodyPr wrap="none" rtlCol="0">
+              <a:spAutoFit/>
+            </a:bodyPr>
+            <a:lstStyle/>
+            <a:p>
+              <a:r>
+                <a:rPr lang="en-US" dirty="0" smtClean="0"/>
+                <a:t>10111</a:t>
+              </a:r>
+              <a:endParaRPr lang="en-US" dirty="0"/>
+            </a:p>
+          </p:txBody>
+        </p:sp>
+        <p:sp>
+          <p:nvSpPr>
+            <p:cNvPr id="121" name="TextBox 120"/>
+            <p:cNvSpPr txBox="1"/>
+            <p:nvPr/>
+          </p:nvSpPr>
+          <p:spPr>
+            <a:xfrm>
+              <a:off x="11265697" y="3951863"/>
+              <a:ext cx="769763" cy="369332"/>
+            </a:xfrm>
+            <a:prstGeom prst="rect">
+              <a:avLst/>
+            </a:prstGeom>
+            <a:noFill/>
+            <a:ln>
+              <a:solidFill>
+                <a:schemeClr val="tx1"/>
+              </a:solidFill>
+            </a:ln>
+          </p:spPr>
+          <p:txBody>
+            <a:bodyPr wrap="none" rtlCol="0">
+              <a:spAutoFit/>
+            </a:bodyPr>
+            <a:lstStyle/>
+            <a:p>
+              <a:r>
+                <a:rPr lang="en-US" dirty="0" smtClean="0"/>
+                <a:t>11000</a:t>
+              </a:r>
+              <a:endParaRPr lang="en-US" dirty="0"/>
+            </a:p>
+          </p:txBody>
+        </p:sp>
+      </p:grpSp>
+      <p:cxnSp>
+        <p:nvCxnSpPr>
+          <p:cNvPr id="171" name="Straight Arrow Connector 170"/>
+          <p:cNvCxnSpPr>
+            <a:stCxn id="4" idx="4"/>
+            <a:endCxn id="169" idx="0"/>
+          </p:cNvCxnSpPr>
+          <p:nvPr/>
+        </p:nvCxnSpPr>
+        <p:spPr>
+          <a:xfrm flipH="1">
+            <a:off x="6408257" y="3821501"/>
+            <a:ext cx="212516" cy="1011428"/>
+          </a:xfrm>
+          <a:prstGeom prst="straightConnector1">
+            <a:avLst/>
+          </a:prstGeom>
+          <a:ln>
+            <a:solidFill>
+              <a:schemeClr val="tx1"/>
+            </a:solidFill>
+            <a:tailEnd type="triangle"/>
+          </a:ln>
+        </p:spPr>
+        <p:style>
+          <a:lnRef idx="1">
+            <a:schemeClr val="accent1"/>
+          </a:lnRef>
+          <a:fillRef idx="0">
+            <a:schemeClr val="accent1"/>
+          </a:fillRef>
+          <a:effectRef idx="0">
+            <a:schemeClr val="accent1"/>
+          </a:effectRef>
+          <a:fontRef idx="minor">
+            <a:schemeClr val="tx1"/>
+          </a:fontRef>
+        </p:style>
+      </p:cxnSp>
+      <p:grpSp>
+        <p:nvGrpSpPr>
+          <p:cNvPr id="180" name="Group 179"/>
+          <p:cNvGrpSpPr/>
+          <p:nvPr/>
+        </p:nvGrpSpPr>
+        <p:grpSpPr>
+          <a:xfrm>
+            <a:off x="5276889" y="4832929"/>
+            <a:ext cx="1566534" cy="1683584"/>
+            <a:chOff x="5276889" y="4832929"/>
+            <a:chExt cx="1566534" cy="1683584"/>
+          </a:xfrm>
+        </p:grpSpPr>
+        <p:sp>
+          <p:nvSpPr>
+            <p:cNvPr id="169" name="Oval 168"/>
+            <p:cNvSpPr/>
+            <p:nvPr/>
+          </p:nvSpPr>
+          <p:spPr>
+            <a:xfrm>
+              <a:off x="5973091" y="4832929"/>
+              <a:ext cx="870332" cy="870332"/>
+            </a:xfrm>
+            <a:prstGeom prst="ellipse">
+              <a:avLst/>
+            </a:prstGeom>
+            <a:solidFill>
+              <a:srgbClr val="00B0F0"/>
+            </a:solidFill>
+            <a:ln>
+              <a:solidFill>
+                <a:schemeClr val="tx1"/>
+              </a:solidFill>
+            </a:ln>
+          </p:spPr>
+          <p:style>
+            <a:lnRef idx="2">
+              <a:schemeClr val="accent1">
+                <a:shade val="50000"/>
+              </a:schemeClr>
+            </a:lnRef>
+            <a:fillRef idx="1">
+              <a:schemeClr val="accent1"/>
+            </a:fillRef>
+            <a:effectRef idx="0">
+              <a:schemeClr val="accent1"/>
+            </a:effectRef>
+            <a:fontRef idx="minor">
+              <a:schemeClr val="lt1"/>
+            </a:fontRef>
+          </p:style>
+          <p:txBody>
+            <a:bodyPr rtlCol="0" anchor="ctr"/>
+            <a:lstStyle/>
+            <a:p>
+              <a:pPr algn="ctr"/>
+              <a:r>
+                <a:rPr lang="en-US" sz="1200" dirty="0" err="1" smtClean="0">
+                  <a:solidFill>
+                    <a:schemeClr val="tx1"/>
+                  </a:solidFill>
+                </a:rPr>
+                <a:t>jr</a:t>
+              </a:r>
+              <a:endParaRPr lang="en-US" sz="1200" dirty="0" smtClean="0">
+                <a:solidFill>
+                  <a:schemeClr val="tx1"/>
+                </a:solidFill>
+              </a:endParaRPr>
+            </a:p>
+            <a:p>
+              <a:pPr algn="ctr"/>
+              <a:r>
+                <a:rPr lang="en-US" sz="1000" dirty="0" err="1" smtClean="0">
+                  <a:solidFill>
+                    <a:schemeClr val="bg1"/>
+                  </a:solidFill>
+                </a:rPr>
+                <a:t>Awrt</a:t>
+              </a:r>
+              <a:endParaRPr lang="en-US" sz="1000" dirty="0" smtClean="0">
+                <a:solidFill>
+                  <a:schemeClr val="bg1"/>
+                </a:solidFill>
+              </a:endParaRPr>
+            </a:p>
+            <a:p>
+              <a:pPr algn="ctr"/>
+              <a:r>
+                <a:rPr lang="en-US" sz="1000" dirty="0" err="1" smtClean="0">
+                  <a:solidFill>
+                    <a:schemeClr val="bg1"/>
+                  </a:solidFill>
+                </a:rPr>
+                <a:t>useReg</a:t>
+              </a:r>
+              <a:endParaRPr lang="en-US" sz="1000" dirty="0">
+                <a:solidFill>
+                  <a:schemeClr val="bg1"/>
+                </a:solidFill>
+              </a:endParaRPr>
+            </a:p>
+          </p:txBody>
+        </p:sp>
+        <p:sp>
+          <p:nvSpPr>
+            <p:cNvPr id="176" name="Oval 175"/>
+            <p:cNvSpPr/>
+            <p:nvPr/>
+          </p:nvSpPr>
+          <p:spPr>
+            <a:xfrm>
+              <a:off x="5276889" y="5754914"/>
+              <a:ext cx="761599" cy="761599"/>
+            </a:xfrm>
+            <a:prstGeom prst="ellipse">
+              <a:avLst/>
+            </a:prstGeom>
+            <a:solidFill>
+              <a:srgbClr val="00B0F0"/>
+            </a:solidFill>
+            <a:ln>
+              <a:solidFill>
+                <a:schemeClr val="tx1"/>
+              </a:solidFill>
+            </a:ln>
+          </p:spPr>
+          <p:style>
+            <a:lnRef idx="2">
+              <a:schemeClr val="accent1">
+                <a:shade val="50000"/>
+              </a:schemeClr>
+            </a:lnRef>
+            <a:fillRef idx="1">
+              <a:schemeClr val="accent1"/>
+            </a:fillRef>
+            <a:effectRef idx="0">
+              <a:schemeClr val="accent1"/>
+            </a:effectRef>
+            <a:fontRef idx="minor">
+              <a:schemeClr val="lt1"/>
+            </a:fontRef>
+          </p:style>
+          <p:txBody>
+            <a:bodyPr rtlCol="0" anchor="ctr"/>
+            <a:lstStyle/>
+            <a:p>
+              <a:pPr algn="ctr"/>
+              <a:r>
+                <a:rPr lang="en-US" sz="1200" dirty="0" err="1" smtClean="0">
+                  <a:solidFill>
+                    <a:schemeClr val="tx1"/>
+                  </a:solidFill>
+                </a:rPr>
+                <a:t>jr</a:t>
+              </a:r>
+              <a:endParaRPr lang="en-US" sz="1200" dirty="0" smtClean="0">
+                <a:solidFill>
+                  <a:schemeClr val="tx1"/>
+                </a:solidFill>
+              </a:endParaRPr>
+            </a:p>
+            <a:p>
+              <a:pPr algn="ctr"/>
+              <a:r>
+                <a:rPr lang="en-US" sz="1000" dirty="0" smtClean="0">
+                  <a:solidFill>
+                    <a:schemeClr val="bg1"/>
+                  </a:solidFill>
+                </a:rPr>
+                <a:t>Jump = 10</a:t>
+              </a:r>
+              <a:endParaRPr lang="en-US" sz="1000" dirty="0">
+                <a:solidFill>
+                  <a:schemeClr val="bg1"/>
+                </a:solidFill>
+              </a:endParaRPr>
+            </a:p>
+          </p:txBody>
+        </p:sp>
+        <p:cxnSp>
+          <p:nvCxnSpPr>
+            <p:cNvPr id="178" name="Straight Arrow Connector 177"/>
+            <p:cNvCxnSpPr>
+              <a:stCxn id="169" idx="3"/>
+              <a:endCxn id="176" idx="7"/>
+            </p:cNvCxnSpPr>
+            <p:nvPr/>
+          </p:nvCxnSpPr>
+          <p:spPr>
+            <a:xfrm flipH="1">
+              <a:off x="5926954" y="5575804"/>
+              <a:ext cx="173594" cy="290644"/>
+            </a:xfrm>
+            <a:prstGeom prst="straightConnector1">
+              <a:avLst/>
+            </a:prstGeom>
+            <a:ln>
+              <a:solidFill>
+                <a:schemeClr val="tx1"/>
+              </a:solidFill>
+              <a:tailEnd type="triangle"/>
+            </a:ln>
+          </p:spPr>
+          <p:style>
+            <a:lnRef idx="1">
+              <a:schemeClr val="accent1"/>
+            </a:lnRef>
+            <a:fillRef idx="0">
+              <a:schemeClr val="accent1"/>
+            </a:fillRef>
+            <a:effectRef idx="0">
+              <a:schemeClr val="accent1"/>
+            </a:effectRef>
+            <a:fontRef idx="minor">
+              <a:schemeClr val="tx1"/>
+            </a:fontRef>
+          </p:style>
+        </p:cxnSp>
+      </p:grpSp>
+      <p:sp>
+        <p:nvSpPr>
+          <p:cNvPr id="183" name="TextBox 182"/>
+          <p:cNvSpPr txBox="1"/>
+          <p:nvPr/>
+        </p:nvSpPr>
+        <p:spPr>
+          <a:xfrm>
+            <a:off x="4214501" y="3665582"/>
+            <a:ext cx="769763" cy="369332"/>
+          </a:xfrm>
+          <a:prstGeom prst="rect">
+            <a:avLst/>
+          </a:prstGeom>
+          <a:noFill/>
+          <a:ln>
+            <a:solidFill>
+              <a:schemeClr val="tx1"/>
+            </a:solidFill>
+          </a:ln>
+        </p:spPr>
+        <p:txBody>
+          <a:bodyPr wrap="none" rtlCol="0">
+            <a:spAutoFit/>
+          </a:bodyPr>
+          <a:lstStyle/>
+          <a:p>
+            <a:r>
+              <a:rPr lang="en-US" dirty="0" smtClean="0"/>
+              <a:t>00111</a:t>
+            </a:r>
+            <a:endParaRPr lang="en-US" dirty="0"/>
+          </a:p>
+        </p:txBody>
+      </p:sp>
+      <p:sp>
+        <p:nvSpPr>
+          <p:cNvPr id="185" name="TextBox 184"/>
+          <p:cNvSpPr txBox="1"/>
+          <p:nvPr/>
+        </p:nvSpPr>
+        <p:spPr>
+          <a:xfrm>
+            <a:off x="6744176" y="5304229"/>
+            <a:ext cx="769763" cy="369332"/>
+          </a:xfrm>
+          <a:prstGeom prst="rect">
+            <a:avLst/>
+          </a:prstGeom>
+          <a:noFill/>
+          <a:ln>
+            <a:solidFill>
+              <a:schemeClr val="tx1"/>
+            </a:solidFill>
+          </a:ln>
+        </p:spPr>
+        <p:txBody>
+          <a:bodyPr wrap="none" rtlCol="0">
+            <a:spAutoFit/>
+          </a:bodyPr>
+          <a:lstStyle/>
+          <a:p>
+            <a:r>
+              <a:rPr lang="en-US" dirty="0" smtClean="0"/>
+              <a:t>10100</a:t>
+            </a:r>
+            <a:endParaRPr lang="en-US" dirty="0"/>
+          </a:p>
+        </p:txBody>
+      </p:sp>
+      <p:sp>
+        <p:nvSpPr>
+          <p:cNvPr id="186" name="TextBox 185"/>
+          <p:cNvSpPr txBox="1"/>
+          <p:nvPr/>
+        </p:nvSpPr>
+        <p:spPr>
+          <a:xfrm>
+            <a:off x="5911354" y="6137440"/>
+            <a:ext cx="769763" cy="369332"/>
+          </a:xfrm>
+          <a:prstGeom prst="rect">
+            <a:avLst/>
+          </a:prstGeom>
+          <a:noFill/>
+          <a:ln>
+            <a:solidFill>
+              <a:schemeClr val="tx1"/>
+            </a:solidFill>
+          </a:ln>
+        </p:spPr>
+        <p:txBody>
+          <a:bodyPr wrap="none" rtlCol="0">
+            <a:spAutoFit/>
+          </a:bodyPr>
+          <a:lstStyle/>
+          <a:p>
+            <a:r>
+              <a:rPr lang="en-US" dirty="0" smtClean="0"/>
+              <a:t>10101</a:t>
+            </a:r>
+            <a:endParaRPr lang="en-US" dirty="0"/>
+          </a:p>
+        </p:txBody>
+      </p:sp>
     </p:spTree>
     <p:extLst>
       <p:ext uri="{BB962C8B-B14F-4D97-AF65-F5344CB8AC3E}">

</xml_diff>